<commit_message>
Ultimas alteracoes antes da apresentacao
</commit_message>
<xml_diff>
--- a/Apresentação/TCC.pptx
+++ b/Apresentação/TCC.pptx
@@ -5,7 +5,7 @@
     <p:sldMasterId id="2147484101" r:id="rId1"/>
   </p:sldMasterIdLst>
   <p:notesMasterIdLst>
-    <p:notesMasterId r:id="rId65"/>
+    <p:notesMasterId r:id="rId66"/>
   </p:notesMasterIdLst>
   <p:sldIdLst>
     <p:sldId id="517" r:id="rId2"/>
@@ -50,27 +50,28 @@
     <p:sldId id="590" r:id="rId41"/>
     <p:sldId id="592" r:id="rId42"/>
     <p:sldId id="593" r:id="rId43"/>
-    <p:sldId id="594" r:id="rId44"/>
-    <p:sldId id="595" r:id="rId45"/>
-    <p:sldId id="596" r:id="rId46"/>
-    <p:sldId id="597" r:id="rId47"/>
-    <p:sldId id="598" r:id="rId48"/>
-    <p:sldId id="599" r:id="rId49"/>
-    <p:sldId id="601" r:id="rId50"/>
-    <p:sldId id="602" r:id="rId51"/>
-    <p:sldId id="613" r:id="rId52"/>
-    <p:sldId id="600" r:id="rId53"/>
-    <p:sldId id="603" r:id="rId54"/>
-    <p:sldId id="604" r:id="rId55"/>
-    <p:sldId id="605" r:id="rId56"/>
-    <p:sldId id="606" r:id="rId57"/>
-    <p:sldId id="607" r:id="rId58"/>
-    <p:sldId id="608" r:id="rId59"/>
-    <p:sldId id="609" r:id="rId60"/>
-    <p:sldId id="610" r:id="rId61"/>
-    <p:sldId id="611" r:id="rId62"/>
-    <p:sldId id="569" r:id="rId63"/>
-    <p:sldId id="546" r:id="rId64"/>
+    <p:sldId id="614" r:id="rId44"/>
+    <p:sldId id="594" r:id="rId45"/>
+    <p:sldId id="595" r:id="rId46"/>
+    <p:sldId id="596" r:id="rId47"/>
+    <p:sldId id="597" r:id="rId48"/>
+    <p:sldId id="598" r:id="rId49"/>
+    <p:sldId id="599" r:id="rId50"/>
+    <p:sldId id="601" r:id="rId51"/>
+    <p:sldId id="602" r:id="rId52"/>
+    <p:sldId id="613" r:id="rId53"/>
+    <p:sldId id="600" r:id="rId54"/>
+    <p:sldId id="603" r:id="rId55"/>
+    <p:sldId id="604" r:id="rId56"/>
+    <p:sldId id="605" r:id="rId57"/>
+    <p:sldId id="606" r:id="rId58"/>
+    <p:sldId id="607" r:id="rId59"/>
+    <p:sldId id="608" r:id="rId60"/>
+    <p:sldId id="609" r:id="rId61"/>
+    <p:sldId id="610" r:id="rId62"/>
+    <p:sldId id="611" r:id="rId63"/>
+    <p:sldId id="569" r:id="rId64"/>
+    <p:sldId id="546" r:id="rId65"/>
   </p:sldIdLst>
   <p:sldSz cx="9144000" cy="6858000" type="screen4x3"/>
   <p:notesSz cx="6858000" cy="9144000"/>
@@ -196,7 +197,7 @@
 <file path=ppt/revisionInfo.xml><?xml version="1.0" encoding="utf-8"?>
 <p1510:revInfo xmlns:a="http://schemas.openxmlformats.org/drawingml/2006/main" xmlns:r="http://schemas.openxmlformats.org/officeDocument/2006/relationships" xmlns:p1510="http://schemas.microsoft.com/office/powerpoint/2015/10/main">
   <p1510:revLst>
-    <p1510:client id="{4617EFB1-FD4B-4777-BEAF-2C28463F5118}" v="377" dt="2019-12-04T04:39:12.631"/>
+    <p1510:client id="{4617EFB1-FD4B-4777-BEAF-2C28463F5118}" v="392" dt="2019-12-05T03:19:46.525"/>
   </p1510:revLst>
 </p1510:revInfo>
 </file>
@@ -204,214 +205,9 @@
 <file path=ppt/changesInfos/changesInfo1.xml><?xml version="1.0" encoding="utf-8"?>
 <pc:chgInfo xmlns:a="http://schemas.openxmlformats.org/drawingml/2006/main" xmlns:r="http://schemas.openxmlformats.org/officeDocument/2006/relationships" xmlns:ac="http://schemas.microsoft.com/office/drawing/2013/main/command" xmlns:pc="http://schemas.microsoft.com/office/powerpoint/2013/main/command">
   <pc:docChgLst>
-    <pc:chgData name="Fabricio Kassardjian" userId="912a6e5d1950f402" providerId="LiveId" clId="{97F4DC58-4984-41A3-985E-67067AFD3860}"/>
-    <pc:docChg chg="custSel addSld delSld modSld sldOrd">
-      <pc:chgData name="Fabricio Kassardjian" userId="912a6e5d1950f402" providerId="LiveId" clId="{97F4DC58-4984-41A3-985E-67067AFD3860}" dt="2019-11-29T13:37:15.342" v="422" actId="20577"/>
-      <pc:docMkLst>
-        <pc:docMk/>
-      </pc:docMkLst>
-      <pc:sldChg chg="modSp">
-        <pc:chgData name="Fabricio Kassardjian" userId="912a6e5d1950f402" providerId="LiveId" clId="{97F4DC58-4984-41A3-985E-67067AFD3860}" dt="2019-11-29T13:37:15.342" v="422" actId="20577"/>
-        <pc:sldMkLst>
-          <pc:docMk/>
-          <pc:sldMk cId="2452686853" sldId="504"/>
-        </pc:sldMkLst>
-        <pc:spChg chg="mod">
-          <ac:chgData name="Fabricio Kassardjian" userId="912a6e5d1950f402" providerId="LiveId" clId="{97F4DC58-4984-41A3-985E-67067AFD3860}" dt="2019-11-29T13:37:15.342" v="422" actId="20577"/>
-          <ac:spMkLst>
-            <pc:docMk/>
-            <pc:sldMk cId="2452686853" sldId="504"/>
-            <ac:spMk id="5" creationId="{E4C27882-E319-405B-A0FC-24C99A3B60B5}"/>
-          </ac:spMkLst>
-        </pc:spChg>
-      </pc:sldChg>
-      <pc:sldChg chg="modSp">
-        <pc:chgData name="Fabricio Kassardjian" userId="912a6e5d1950f402" providerId="LiveId" clId="{97F4DC58-4984-41A3-985E-67067AFD3860}" dt="2019-11-29T13:31:48.684" v="89" actId="6549"/>
-        <pc:sldMkLst>
-          <pc:docMk/>
-          <pc:sldMk cId="618333178" sldId="517"/>
-        </pc:sldMkLst>
-        <pc:spChg chg="mod">
-          <ac:chgData name="Fabricio Kassardjian" userId="912a6e5d1950f402" providerId="LiveId" clId="{97F4DC58-4984-41A3-985E-67067AFD3860}" dt="2019-11-29T13:30:48.206" v="62" actId="20577"/>
-          <ac:spMkLst>
-            <pc:docMk/>
-            <pc:sldMk cId="618333178" sldId="517"/>
-            <ac:spMk id="7" creationId="{31BA2962-6695-42DE-A7C7-0C60819DCA59}"/>
-          </ac:spMkLst>
-        </pc:spChg>
-        <pc:spChg chg="mod">
-          <ac:chgData name="Fabricio Kassardjian" userId="912a6e5d1950f402" providerId="LiveId" clId="{97F4DC58-4984-41A3-985E-67067AFD3860}" dt="2019-11-29T13:31:48.684" v="89" actId="6549"/>
-          <ac:spMkLst>
-            <pc:docMk/>
-            <pc:sldMk cId="618333178" sldId="517"/>
-            <ac:spMk id="11" creationId="{90138455-4687-4F61-B307-C43EDB3F578F}"/>
-          </ac:spMkLst>
-        </pc:spChg>
-      </pc:sldChg>
-      <pc:sldChg chg="del">
-        <pc:chgData name="Fabricio Kassardjian" userId="912a6e5d1950f402" providerId="LiveId" clId="{97F4DC58-4984-41A3-985E-67067AFD3860}" dt="2019-11-29T13:35:38.588" v="333" actId="2696"/>
-        <pc:sldMkLst>
-          <pc:docMk/>
-          <pc:sldMk cId="2922097082" sldId="518"/>
-        </pc:sldMkLst>
-      </pc:sldChg>
-      <pc:sldChg chg="del">
-        <pc:chgData name="Fabricio Kassardjian" userId="912a6e5d1950f402" providerId="LiveId" clId="{97F4DC58-4984-41A3-985E-67067AFD3860}" dt="2019-11-29T13:34:14.585" v="179" actId="2696"/>
-        <pc:sldMkLst>
-          <pc:docMk/>
-          <pc:sldMk cId="3333326940" sldId="519"/>
-        </pc:sldMkLst>
-      </pc:sldChg>
-      <pc:sldChg chg="del">
-        <pc:chgData name="Fabricio Kassardjian" userId="912a6e5d1950f402" providerId="LiveId" clId="{97F4DC58-4984-41A3-985E-67067AFD3860}" dt="2019-11-29T13:35:40.419" v="334" actId="2696"/>
-        <pc:sldMkLst>
-          <pc:docMk/>
-          <pc:sldMk cId="1832481542" sldId="520"/>
-        </pc:sldMkLst>
-      </pc:sldChg>
-      <pc:sldChg chg="del">
-        <pc:chgData name="Fabricio Kassardjian" userId="912a6e5d1950f402" providerId="LiveId" clId="{97F4DC58-4984-41A3-985E-67067AFD3860}" dt="2019-11-29T13:35:46.965" v="335" actId="2696"/>
-        <pc:sldMkLst>
-          <pc:docMk/>
-          <pc:sldMk cId="2906388585" sldId="540"/>
-        </pc:sldMkLst>
-      </pc:sldChg>
-      <pc:sldChg chg="modSp">
-        <pc:chgData name="Fabricio Kassardjian" userId="912a6e5d1950f402" providerId="LiveId" clId="{97F4DC58-4984-41A3-985E-67067AFD3860}" dt="2019-11-29T13:36:51.983" v="402" actId="20577"/>
-        <pc:sldMkLst>
-          <pc:docMk/>
-          <pc:sldMk cId="763771652" sldId="542"/>
-        </pc:sldMkLst>
-        <pc:spChg chg="mod">
-          <ac:chgData name="Fabricio Kassardjian" userId="912a6e5d1950f402" providerId="LiveId" clId="{97F4DC58-4984-41A3-985E-67067AFD3860}" dt="2019-11-29T13:36:51.983" v="402" actId="20577"/>
-          <ac:spMkLst>
-            <pc:docMk/>
-            <pc:sldMk cId="763771652" sldId="542"/>
-            <ac:spMk id="7" creationId="{F73E018D-5587-40E7-9F2A-A5E1AA30FD59}"/>
-          </ac:spMkLst>
-        </pc:spChg>
-      </pc:sldChg>
-      <pc:sldChg chg="delSp modSp">
-        <pc:chgData name="Fabricio Kassardjian" userId="912a6e5d1950f402" providerId="LiveId" clId="{97F4DC58-4984-41A3-985E-67067AFD3860}" dt="2019-11-29T13:36:15.030" v="352" actId="478"/>
-        <pc:sldMkLst>
-          <pc:docMk/>
-          <pc:sldMk cId="975161573" sldId="544"/>
-        </pc:sldMkLst>
-        <pc:spChg chg="mod">
-          <ac:chgData name="Fabricio Kassardjian" userId="912a6e5d1950f402" providerId="LiveId" clId="{97F4DC58-4984-41A3-985E-67067AFD3860}" dt="2019-11-29T13:36:12.324" v="351" actId="20577"/>
-          <ac:spMkLst>
-            <pc:docMk/>
-            <pc:sldMk cId="975161573" sldId="544"/>
-            <ac:spMk id="5" creationId="{57E1EA3A-ACCA-4ED2-BB2A-96BC1613917E}"/>
-          </ac:spMkLst>
-        </pc:spChg>
-        <pc:spChg chg="mod">
-          <ac:chgData name="Fabricio Kassardjian" userId="912a6e5d1950f402" providerId="LiveId" clId="{97F4DC58-4984-41A3-985E-67067AFD3860}" dt="2019-11-29T13:35:55.545" v="339" actId="20577"/>
-          <ac:spMkLst>
-            <pc:docMk/>
-            <pc:sldMk cId="975161573" sldId="544"/>
-            <ac:spMk id="7" creationId="{F73E018D-5587-40E7-9F2A-A5E1AA30FD59}"/>
-          </ac:spMkLst>
-        </pc:spChg>
-        <pc:picChg chg="del">
-          <ac:chgData name="Fabricio Kassardjian" userId="912a6e5d1950f402" providerId="LiveId" clId="{97F4DC58-4984-41A3-985E-67067AFD3860}" dt="2019-11-29T13:36:15.030" v="352" actId="478"/>
-          <ac:picMkLst>
-            <pc:docMk/>
-            <pc:sldMk cId="975161573" sldId="544"/>
-            <ac:picMk id="3" creationId="{4E4BFE32-A7CE-4448-916B-F77A1CB747A9}"/>
-          </ac:picMkLst>
-        </pc:picChg>
-      </pc:sldChg>
-      <pc:sldChg chg="addSp modSp add">
-        <pc:chgData name="Fabricio Kassardjian" userId="912a6e5d1950f402" providerId="LiveId" clId="{97F4DC58-4984-41A3-985E-67067AFD3860}" dt="2019-11-29T13:34:58.604" v="254" actId="20577"/>
-        <pc:sldMkLst>
-          <pc:docMk/>
-          <pc:sldMk cId="3834853037" sldId="547"/>
-        </pc:sldMkLst>
-        <pc:spChg chg="mod">
-          <ac:chgData name="Fabricio Kassardjian" userId="912a6e5d1950f402" providerId="LiveId" clId="{97F4DC58-4984-41A3-985E-67067AFD3860}" dt="2019-11-29T13:34:58.604" v="254" actId="20577"/>
-          <ac:spMkLst>
-            <pc:docMk/>
-            <pc:sldMk cId="3834853037" sldId="547"/>
-            <ac:spMk id="5" creationId="{E4C27882-E319-405B-A0FC-24C99A3B60B5}"/>
-          </ac:spMkLst>
-        </pc:spChg>
-        <pc:spChg chg="add ord">
-          <ac:chgData name="Fabricio Kassardjian" userId="912a6e5d1950f402" providerId="LiveId" clId="{97F4DC58-4984-41A3-985E-67067AFD3860}" dt="2019-11-29T13:34:09.012" v="178" actId="167"/>
-          <ac:spMkLst>
-            <pc:docMk/>
-            <pc:sldMk cId="3834853037" sldId="547"/>
-            <ac:spMk id="6" creationId="{F70BB2AE-D17C-4909-A257-36E063E54DB1}"/>
-          </ac:spMkLst>
-        </pc:spChg>
-      </pc:sldChg>
-      <pc:sldChg chg="modSp add">
-        <pc:chgData name="Fabricio Kassardjian" userId="912a6e5d1950f402" providerId="LiveId" clId="{97F4DC58-4984-41A3-985E-67067AFD3860}" dt="2019-11-29T13:35:07.480" v="276" actId="20577"/>
-        <pc:sldMkLst>
-          <pc:docMk/>
-          <pc:sldMk cId="1488619366" sldId="548"/>
-        </pc:sldMkLst>
-        <pc:spChg chg="mod">
-          <ac:chgData name="Fabricio Kassardjian" userId="912a6e5d1950f402" providerId="LiveId" clId="{97F4DC58-4984-41A3-985E-67067AFD3860}" dt="2019-11-29T13:35:07.480" v="276" actId="20577"/>
-          <ac:spMkLst>
-            <pc:docMk/>
-            <pc:sldMk cId="1488619366" sldId="548"/>
-            <ac:spMk id="5" creationId="{E4C27882-E319-405B-A0FC-24C99A3B60B5}"/>
-          </ac:spMkLst>
-        </pc:spChg>
-        <pc:spChg chg="mod">
-          <ac:chgData name="Fabricio Kassardjian" userId="912a6e5d1950f402" providerId="LiveId" clId="{97F4DC58-4984-41A3-985E-67067AFD3860}" dt="2019-11-29T13:34:32.075" v="206" actId="1035"/>
-          <ac:spMkLst>
-            <pc:docMk/>
-            <pc:sldMk cId="1488619366" sldId="548"/>
-            <ac:spMk id="6" creationId="{F70BB2AE-D17C-4909-A257-36E063E54DB1}"/>
-          </ac:spMkLst>
-        </pc:spChg>
-      </pc:sldChg>
-      <pc:sldChg chg="modSp add">
-        <pc:chgData name="Fabricio Kassardjian" userId="912a6e5d1950f402" providerId="LiveId" clId="{97F4DC58-4984-41A3-985E-67067AFD3860}" dt="2019-11-29T13:35:18.934" v="296" actId="20577"/>
-        <pc:sldMkLst>
-          <pc:docMk/>
-          <pc:sldMk cId="611014377" sldId="549"/>
-        </pc:sldMkLst>
-        <pc:spChg chg="mod">
-          <ac:chgData name="Fabricio Kassardjian" userId="912a6e5d1950f402" providerId="LiveId" clId="{97F4DC58-4984-41A3-985E-67067AFD3860}" dt="2019-11-29T13:35:18.934" v="296" actId="20577"/>
-          <ac:spMkLst>
-            <pc:docMk/>
-            <pc:sldMk cId="611014377" sldId="549"/>
-            <ac:spMk id="5" creationId="{E4C27882-E319-405B-A0FC-24C99A3B60B5}"/>
-          </ac:spMkLst>
-        </pc:spChg>
-        <pc:spChg chg="mod">
-          <ac:chgData name="Fabricio Kassardjian" userId="912a6e5d1950f402" providerId="LiveId" clId="{97F4DC58-4984-41A3-985E-67067AFD3860}" dt="2019-11-29T13:34:42.450" v="234" actId="1035"/>
-          <ac:spMkLst>
-            <pc:docMk/>
-            <pc:sldMk cId="611014377" sldId="549"/>
-            <ac:spMk id="6" creationId="{F70BB2AE-D17C-4909-A257-36E063E54DB1}"/>
-          </ac:spMkLst>
-        </pc:spChg>
-      </pc:sldChg>
-      <pc:sldChg chg="modSp add ord">
-        <pc:chgData name="Fabricio Kassardjian" userId="912a6e5d1950f402" providerId="LiveId" clId="{97F4DC58-4984-41A3-985E-67067AFD3860}" dt="2019-11-29T13:35:50.075" v="337"/>
-        <pc:sldMkLst>
-          <pc:docMk/>
-          <pc:sldMk cId="1545497083" sldId="550"/>
-        </pc:sldMkLst>
-        <pc:spChg chg="mod">
-          <ac:chgData name="Fabricio Kassardjian" userId="912a6e5d1950f402" providerId="LiveId" clId="{97F4DC58-4984-41A3-985E-67067AFD3860}" dt="2019-11-29T13:35:33.953" v="332" actId="1036"/>
-          <ac:spMkLst>
-            <pc:docMk/>
-            <pc:sldMk cId="1545497083" sldId="550"/>
-            <ac:spMk id="6" creationId="{F70BB2AE-D17C-4909-A257-36E063E54DB1}"/>
-          </ac:spMkLst>
-        </pc:spChg>
-      </pc:sldChg>
-    </pc:docChg>
-  </pc:docChgLst>
-  <pc:docChgLst>
     <pc:chgData name="Fabricio Kassardjian" userId="912a6e5d1950f402" providerId="LiveId" clId="{4617EFB1-FD4B-4777-BEAF-2C28463F5118}"/>
     <pc:docChg chg="undo custSel addSld delSld modSld modMainMaster">
-      <pc:chgData name="Fabricio Kassardjian" userId="912a6e5d1950f402" providerId="LiveId" clId="{4617EFB1-FD4B-4777-BEAF-2C28463F5118}" dt="2019-12-04T04:39:59.102" v="12630" actId="1036"/>
+      <pc:chgData name="Fabricio Kassardjian" userId="912a6e5d1950f402" providerId="LiveId" clId="{4617EFB1-FD4B-4777-BEAF-2C28463F5118}" dt="2019-12-05T04:16:11.161" v="12770" actId="20577"/>
       <pc:docMkLst>
         <pc:docMk/>
       </pc:docMkLst>
@@ -2479,6 +2275,186 @@
           </ac:picMkLst>
         </pc:picChg>
       </pc:sldChg>
+      <pc:sldChg chg="addSp delSp modSp">
+        <pc:chgData name="Fabricio Kassardjian" userId="912a6e5d1950f402" providerId="LiveId" clId="{4617EFB1-FD4B-4777-BEAF-2C28463F5118}" dt="2019-12-05T03:20:02.812" v="12767" actId="1076"/>
+        <pc:sldMkLst>
+          <pc:docMk/>
+          <pc:sldMk cId="1364355218" sldId="593"/>
+        </pc:sldMkLst>
+        <pc:spChg chg="mod">
+          <ac:chgData name="Fabricio Kassardjian" userId="912a6e5d1950f402" providerId="LiveId" clId="{4617EFB1-FD4B-4777-BEAF-2C28463F5118}" dt="2019-12-05T03:19:57.284" v="12766" actId="20577"/>
+          <ac:spMkLst>
+            <pc:docMk/>
+            <pc:sldMk cId="1364355218" sldId="593"/>
+            <ac:spMk id="2" creationId="{9DB2F473-C27D-46A6-90B3-E09A44F9D0C8}"/>
+          </ac:spMkLst>
+        </pc:spChg>
+        <pc:picChg chg="mod">
+          <ac:chgData name="Fabricio Kassardjian" userId="912a6e5d1950f402" providerId="LiveId" clId="{4617EFB1-FD4B-4777-BEAF-2C28463F5118}" dt="2019-12-05T02:45:44.094" v="12669" actId="1036"/>
+          <ac:picMkLst>
+            <pc:docMk/>
+            <pc:sldMk cId="1364355218" sldId="593"/>
+            <ac:picMk id="6" creationId="{B4197F7D-5945-46B0-9BCD-BC493474D5F7}"/>
+          </ac:picMkLst>
+        </pc:picChg>
+        <pc:picChg chg="del">
+          <ac:chgData name="Fabricio Kassardjian" userId="912a6e5d1950f402" providerId="LiveId" clId="{4617EFB1-FD4B-4777-BEAF-2C28463F5118}" dt="2019-12-05T02:41:29.831" v="12631" actId="478"/>
+          <ac:picMkLst>
+            <pc:docMk/>
+            <pc:sldMk cId="1364355218" sldId="593"/>
+            <ac:picMk id="7" creationId="{35C7FAAB-4EFC-4D2A-AC1A-5253AB627212}"/>
+          </ac:picMkLst>
+        </pc:picChg>
+        <pc:picChg chg="del">
+          <ac:chgData name="Fabricio Kassardjian" userId="912a6e5d1950f402" providerId="LiveId" clId="{4617EFB1-FD4B-4777-BEAF-2C28463F5118}" dt="2019-12-05T03:19:51.229" v="12764" actId="478"/>
+          <ac:picMkLst>
+            <pc:docMk/>
+            <pc:sldMk cId="1364355218" sldId="593"/>
+            <ac:picMk id="8" creationId="{E5B3959C-6874-4444-A18E-7F8B10558258}"/>
+          </ac:picMkLst>
+        </pc:picChg>
+        <pc:picChg chg="add del mod">
+          <ac:chgData name="Fabricio Kassardjian" userId="912a6e5d1950f402" providerId="LiveId" clId="{4617EFB1-FD4B-4777-BEAF-2C28463F5118}" dt="2019-12-05T02:42:13.510" v="12634" actId="478"/>
+          <ac:picMkLst>
+            <pc:docMk/>
+            <pc:sldMk cId="1364355218" sldId="593"/>
+            <ac:picMk id="9" creationId="{C476C7FF-064A-4914-AA97-7E8022B31F44}"/>
+          </ac:picMkLst>
+        </pc:picChg>
+        <pc:picChg chg="add del mod">
+          <ac:chgData name="Fabricio Kassardjian" userId="912a6e5d1950f402" providerId="LiveId" clId="{4617EFB1-FD4B-4777-BEAF-2C28463F5118}" dt="2019-12-05T02:43:27.578" v="12637" actId="478"/>
+          <ac:picMkLst>
+            <pc:docMk/>
+            <pc:sldMk cId="1364355218" sldId="593"/>
+            <ac:picMk id="10" creationId="{93336552-0D5C-409B-9B2C-36001EE02429}"/>
+          </ac:picMkLst>
+        </pc:picChg>
+        <pc:picChg chg="add del mod">
+          <ac:chgData name="Fabricio Kassardjian" userId="912a6e5d1950f402" providerId="LiveId" clId="{4617EFB1-FD4B-4777-BEAF-2C28463F5118}" dt="2019-12-05T02:52:04.837" v="12745" actId="478"/>
+          <ac:picMkLst>
+            <pc:docMk/>
+            <pc:sldMk cId="1364355218" sldId="593"/>
+            <ac:picMk id="11" creationId="{06EF8647-3FE1-456D-BE93-F177D0839898}"/>
+          </ac:picMkLst>
+        </pc:picChg>
+        <pc:picChg chg="add mod">
+          <ac:chgData name="Fabricio Kassardjian" userId="912a6e5d1950f402" providerId="LiveId" clId="{4617EFB1-FD4B-4777-BEAF-2C28463F5118}" dt="2019-12-05T02:48:56.971" v="12738" actId="1036"/>
+          <ac:picMkLst>
+            <pc:docMk/>
+            <pc:sldMk cId="1364355218" sldId="593"/>
+            <ac:picMk id="12" creationId="{F990910F-B17E-466E-BDF0-011C6D8EF831}"/>
+          </ac:picMkLst>
+        </pc:picChg>
+        <pc:picChg chg="add del mod">
+          <ac:chgData name="Fabricio Kassardjian" userId="912a6e5d1950f402" providerId="LiveId" clId="{4617EFB1-FD4B-4777-BEAF-2C28463F5118}" dt="2019-12-05T02:51:38.365" v="12742" actId="478"/>
+          <ac:picMkLst>
+            <pc:docMk/>
+            <pc:sldMk cId="1364355218" sldId="593"/>
+            <ac:picMk id="13" creationId="{1C712AB5-5330-4D71-BD6C-4ADB4C0BC28A}"/>
+          </ac:picMkLst>
+        </pc:picChg>
+        <pc:picChg chg="add mod">
+          <ac:chgData name="Fabricio Kassardjian" userId="912a6e5d1950f402" providerId="LiveId" clId="{4617EFB1-FD4B-4777-BEAF-2C28463F5118}" dt="2019-12-05T02:51:44.843" v="12744" actId="1076"/>
+          <ac:picMkLst>
+            <pc:docMk/>
+            <pc:sldMk cId="1364355218" sldId="593"/>
+            <ac:picMk id="14" creationId="{A0DC37B5-CEDA-4EC1-897F-6569C196D002}"/>
+          </ac:picMkLst>
+        </pc:picChg>
+        <pc:picChg chg="add del mod">
+          <ac:chgData name="Fabricio Kassardjian" userId="912a6e5d1950f402" providerId="LiveId" clId="{4617EFB1-FD4B-4777-BEAF-2C28463F5118}" dt="2019-12-05T03:19:07.070" v="12762" actId="478"/>
+          <ac:picMkLst>
+            <pc:docMk/>
+            <pc:sldMk cId="1364355218" sldId="593"/>
+            <ac:picMk id="15" creationId="{6086A6D8-6EE3-49C3-A8B0-9F07F678112E}"/>
+          </ac:picMkLst>
+        </pc:picChg>
+        <pc:picChg chg="add mod">
+          <ac:chgData name="Fabricio Kassardjian" userId="912a6e5d1950f402" providerId="LiveId" clId="{4617EFB1-FD4B-4777-BEAF-2C28463F5118}" dt="2019-12-05T03:20:02.812" v="12767" actId="1076"/>
+          <ac:picMkLst>
+            <pc:docMk/>
+            <pc:sldMk cId="1364355218" sldId="593"/>
+            <ac:picMk id="16" creationId="{BDD3D6B3-837E-4EC6-A0E6-E6ECE98DFF32}"/>
+          </ac:picMkLst>
+        </pc:picChg>
+      </pc:sldChg>
+      <pc:sldChg chg="delSp">
+        <pc:chgData name="Fabricio Kassardjian" userId="912a6e5d1950f402" providerId="LiveId" clId="{4617EFB1-FD4B-4777-BEAF-2C28463F5118}" dt="2019-12-05T03:18:38.589" v="12758" actId="478"/>
+        <pc:sldMkLst>
+          <pc:docMk/>
+          <pc:sldMk cId="313730423" sldId="594"/>
+        </pc:sldMkLst>
+        <pc:picChg chg="del">
+          <ac:chgData name="Fabricio Kassardjian" userId="912a6e5d1950f402" providerId="LiveId" clId="{4617EFB1-FD4B-4777-BEAF-2C28463F5118}" dt="2019-12-05T03:18:36.116" v="12757" actId="478"/>
+          <ac:picMkLst>
+            <pc:docMk/>
+            <pc:sldMk cId="313730423" sldId="594"/>
+            <ac:picMk id="7" creationId="{7C3B2D85-23E6-40BC-8E8E-FEDDF5F1ED07}"/>
+          </ac:picMkLst>
+        </pc:picChg>
+        <pc:picChg chg="del">
+          <ac:chgData name="Fabricio Kassardjian" userId="912a6e5d1950f402" providerId="LiveId" clId="{4617EFB1-FD4B-4777-BEAF-2C28463F5118}" dt="2019-12-05T03:18:38.589" v="12758" actId="478"/>
+          <ac:picMkLst>
+            <pc:docMk/>
+            <pc:sldMk cId="313730423" sldId="594"/>
+            <ac:picMk id="8" creationId="{34D8A52B-B7FE-40FB-9B14-8BA278687B53}"/>
+          </ac:picMkLst>
+        </pc:picChg>
+      </pc:sldChg>
+      <pc:sldChg chg="modSp">
+        <pc:chgData name="Fabricio Kassardjian" userId="912a6e5d1950f402" providerId="LiveId" clId="{4617EFB1-FD4B-4777-BEAF-2C28463F5118}" dt="2019-12-05T04:16:11.161" v="12770" actId="20577"/>
+        <pc:sldMkLst>
+          <pc:docMk/>
+          <pc:sldMk cId="332057529" sldId="599"/>
+        </pc:sldMkLst>
+        <pc:graphicFrameChg chg="modGraphic">
+          <ac:chgData name="Fabricio Kassardjian" userId="912a6e5d1950f402" providerId="LiveId" clId="{4617EFB1-FD4B-4777-BEAF-2C28463F5118}" dt="2019-12-05T04:16:11.161" v="12770" actId="20577"/>
+          <ac:graphicFrameMkLst>
+            <pc:docMk/>
+            <pc:sldMk cId="332057529" sldId="599"/>
+            <ac:graphicFrameMk id="11" creationId="{C0DF9601-8ABC-46D4-9217-0D964DAFA0FE}"/>
+          </ac:graphicFrameMkLst>
+        </pc:graphicFrameChg>
+      </pc:sldChg>
+      <pc:sldChg chg="addSp modSp add">
+        <pc:chgData name="Fabricio Kassardjian" userId="912a6e5d1950f402" providerId="LiveId" clId="{4617EFB1-FD4B-4777-BEAF-2C28463F5118}" dt="2019-12-05T03:18:55.280" v="12761" actId="1076"/>
+        <pc:sldMkLst>
+          <pc:docMk/>
+          <pc:sldMk cId="3678114660" sldId="614"/>
+        </pc:sldMkLst>
+        <pc:spChg chg="mod">
+          <ac:chgData name="Fabricio Kassardjian" userId="912a6e5d1950f402" providerId="LiveId" clId="{4617EFB1-FD4B-4777-BEAF-2C28463F5118}" dt="2019-12-05T03:18:48.951" v="12759" actId="20577"/>
+          <ac:spMkLst>
+            <pc:docMk/>
+            <pc:sldMk cId="3678114660" sldId="614"/>
+            <ac:spMk id="2" creationId="{F03C2F21-D338-4655-BD72-C4C896381CC5}"/>
+          </ac:spMkLst>
+        </pc:spChg>
+        <pc:spChg chg="mod">
+          <ac:chgData name="Fabricio Kassardjian" userId="912a6e5d1950f402" providerId="LiveId" clId="{4617EFB1-FD4B-4777-BEAF-2C28463F5118}" dt="2019-12-05T03:17:53.214" v="12750"/>
+          <ac:spMkLst>
+            <pc:docMk/>
+            <pc:sldMk cId="3678114660" sldId="614"/>
+            <ac:spMk id="3" creationId="{DA1328C1-BFB6-4BEB-9D4A-88BBD69047A2}"/>
+          </ac:spMkLst>
+        </pc:spChg>
+        <pc:spChg chg="add">
+          <ac:chgData name="Fabricio Kassardjian" userId="912a6e5d1950f402" providerId="LiveId" clId="{4617EFB1-FD4B-4777-BEAF-2C28463F5118}" dt="2019-12-05T03:17:47.127" v="12749"/>
+          <ac:spMkLst>
+            <pc:docMk/>
+            <pc:sldMk cId="3678114660" sldId="614"/>
+            <ac:spMk id="4" creationId="{B35E30AF-37BE-46C2-8DEB-1C145144E7B6}"/>
+          </ac:spMkLst>
+        </pc:spChg>
+        <pc:picChg chg="add mod">
+          <ac:chgData name="Fabricio Kassardjian" userId="912a6e5d1950f402" providerId="LiveId" clId="{4617EFB1-FD4B-4777-BEAF-2C28463F5118}" dt="2019-12-05T03:18:55.280" v="12761" actId="1076"/>
+          <ac:picMkLst>
+            <pc:docMk/>
+            <pc:sldMk cId="3678114660" sldId="614"/>
+            <ac:picMk id="5" creationId="{B571BD29-8E43-4ABA-A972-1180B133E075}"/>
+          </ac:picMkLst>
+        </pc:picChg>
+      </pc:sldChg>
       <pc:sldMasterChg chg="addSp delSp modSp modSldLayout">
         <pc:chgData name="Fabricio Kassardjian" userId="912a6e5d1950f402" providerId="LiveId" clId="{4617EFB1-FD4B-4777-BEAF-2C28463F5118}" dt="2019-12-02T01:57:13.351" v="692" actId="404"/>
         <pc:sldMasterMkLst>
@@ -2807,6 +2783,211 @@
       </pc:sldMasterChg>
     </pc:docChg>
   </pc:docChgLst>
+  <pc:docChgLst>
+    <pc:chgData name="Fabricio Kassardjian" userId="912a6e5d1950f402" providerId="LiveId" clId="{97F4DC58-4984-41A3-985E-67067AFD3860}"/>
+    <pc:docChg chg="custSel addSld delSld modSld sldOrd">
+      <pc:chgData name="Fabricio Kassardjian" userId="912a6e5d1950f402" providerId="LiveId" clId="{97F4DC58-4984-41A3-985E-67067AFD3860}" dt="2019-11-29T13:37:15.342" v="422" actId="20577"/>
+      <pc:docMkLst>
+        <pc:docMk/>
+      </pc:docMkLst>
+      <pc:sldChg chg="modSp">
+        <pc:chgData name="Fabricio Kassardjian" userId="912a6e5d1950f402" providerId="LiveId" clId="{97F4DC58-4984-41A3-985E-67067AFD3860}" dt="2019-11-29T13:37:15.342" v="422" actId="20577"/>
+        <pc:sldMkLst>
+          <pc:docMk/>
+          <pc:sldMk cId="2452686853" sldId="504"/>
+        </pc:sldMkLst>
+        <pc:spChg chg="mod">
+          <ac:chgData name="Fabricio Kassardjian" userId="912a6e5d1950f402" providerId="LiveId" clId="{97F4DC58-4984-41A3-985E-67067AFD3860}" dt="2019-11-29T13:37:15.342" v="422" actId="20577"/>
+          <ac:spMkLst>
+            <pc:docMk/>
+            <pc:sldMk cId="2452686853" sldId="504"/>
+            <ac:spMk id="5" creationId="{E4C27882-E319-405B-A0FC-24C99A3B60B5}"/>
+          </ac:spMkLst>
+        </pc:spChg>
+      </pc:sldChg>
+      <pc:sldChg chg="modSp">
+        <pc:chgData name="Fabricio Kassardjian" userId="912a6e5d1950f402" providerId="LiveId" clId="{97F4DC58-4984-41A3-985E-67067AFD3860}" dt="2019-11-29T13:31:48.684" v="89" actId="6549"/>
+        <pc:sldMkLst>
+          <pc:docMk/>
+          <pc:sldMk cId="618333178" sldId="517"/>
+        </pc:sldMkLst>
+        <pc:spChg chg="mod">
+          <ac:chgData name="Fabricio Kassardjian" userId="912a6e5d1950f402" providerId="LiveId" clId="{97F4DC58-4984-41A3-985E-67067AFD3860}" dt="2019-11-29T13:30:48.206" v="62" actId="20577"/>
+          <ac:spMkLst>
+            <pc:docMk/>
+            <pc:sldMk cId="618333178" sldId="517"/>
+            <ac:spMk id="7" creationId="{31BA2962-6695-42DE-A7C7-0C60819DCA59}"/>
+          </ac:spMkLst>
+        </pc:spChg>
+        <pc:spChg chg="mod">
+          <ac:chgData name="Fabricio Kassardjian" userId="912a6e5d1950f402" providerId="LiveId" clId="{97F4DC58-4984-41A3-985E-67067AFD3860}" dt="2019-11-29T13:31:48.684" v="89" actId="6549"/>
+          <ac:spMkLst>
+            <pc:docMk/>
+            <pc:sldMk cId="618333178" sldId="517"/>
+            <ac:spMk id="11" creationId="{90138455-4687-4F61-B307-C43EDB3F578F}"/>
+          </ac:spMkLst>
+        </pc:spChg>
+      </pc:sldChg>
+      <pc:sldChg chg="del">
+        <pc:chgData name="Fabricio Kassardjian" userId="912a6e5d1950f402" providerId="LiveId" clId="{97F4DC58-4984-41A3-985E-67067AFD3860}" dt="2019-11-29T13:35:38.588" v="333" actId="2696"/>
+        <pc:sldMkLst>
+          <pc:docMk/>
+          <pc:sldMk cId="2922097082" sldId="518"/>
+        </pc:sldMkLst>
+      </pc:sldChg>
+      <pc:sldChg chg="del">
+        <pc:chgData name="Fabricio Kassardjian" userId="912a6e5d1950f402" providerId="LiveId" clId="{97F4DC58-4984-41A3-985E-67067AFD3860}" dt="2019-11-29T13:34:14.585" v="179" actId="2696"/>
+        <pc:sldMkLst>
+          <pc:docMk/>
+          <pc:sldMk cId="3333326940" sldId="519"/>
+        </pc:sldMkLst>
+      </pc:sldChg>
+      <pc:sldChg chg="del">
+        <pc:chgData name="Fabricio Kassardjian" userId="912a6e5d1950f402" providerId="LiveId" clId="{97F4DC58-4984-41A3-985E-67067AFD3860}" dt="2019-11-29T13:35:40.419" v="334" actId="2696"/>
+        <pc:sldMkLst>
+          <pc:docMk/>
+          <pc:sldMk cId="1832481542" sldId="520"/>
+        </pc:sldMkLst>
+      </pc:sldChg>
+      <pc:sldChg chg="del">
+        <pc:chgData name="Fabricio Kassardjian" userId="912a6e5d1950f402" providerId="LiveId" clId="{97F4DC58-4984-41A3-985E-67067AFD3860}" dt="2019-11-29T13:35:46.965" v="335" actId="2696"/>
+        <pc:sldMkLst>
+          <pc:docMk/>
+          <pc:sldMk cId="2906388585" sldId="540"/>
+        </pc:sldMkLst>
+      </pc:sldChg>
+      <pc:sldChg chg="modSp">
+        <pc:chgData name="Fabricio Kassardjian" userId="912a6e5d1950f402" providerId="LiveId" clId="{97F4DC58-4984-41A3-985E-67067AFD3860}" dt="2019-11-29T13:36:51.983" v="402" actId="20577"/>
+        <pc:sldMkLst>
+          <pc:docMk/>
+          <pc:sldMk cId="763771652" sldId="542"/>
+        </pc:sldMkLst>
+        <pc:spChg chg="mod">
+          <ac:chgData name="Fabricio Kassardjian" userId="912a6e5d1950f402" providerId="LiveId" clId="{97F4DC58-4984-41A3-985E-67067AFD3860}" dt="2019-11-29T13:36:51.983" v="402" actId="20577"/>
+          <ac:spMkLst>
+            <pc:docMk/>
+            <pc:sldMk cId="763771652" sldId="542"/>
+            <ac:spMk id="7" creationId="{F73E018D-5587-40E7-9F2A-A5E1AA30FD59}"/>
+          </ac:spMkLst>
+        </pc:spChg>
+      </pc:sldChg>
+      <pc:sldChg chg="delSp modSp">
+        <pc:chgData name="Fabricio Kassardjian" userId="912a6e5d1950f402" providerId="LiveId" clId="{97F4DC58-4984-41A3-985E-67067AFD3860}" dt="2019-11-29T13:36:15.030" v="352" actId="478"/>
+        <pc:sldMkLst>
+          <pc:docMk/>
+          <pc:sldMk cId="975161573" sldId="544"/>
+        </pc:sldMkLst>
+        <pc:spChg chg="mod">
+          <ac:chgData name="Fabricio Kassardjian" userId="912a6e5d1950f402" providerId="LiveId" clId="{97F4DC58-4984-41A3-985E-67067AFD3860}" dt="2019-11-29T13:36:12.324" v="351" actId="20577"/>
+          <ac:spMkLst>
+            <pc:docMk/>
+            <pc:sldMk cId="975161573" sldId="544"/>
+            <ac:spMk id="5" creationId="{57E1EA3A-ACCA-4ED2-BB2A-96BC1613917E}"/>
+          </ac:spMkLst>
+        </pc:spChg>
+        <pc:spChg chg="mod">
+          <ac:chgData name="Fabricio Kassardjian" userId="912a6e5d1950f402" providerId="LiveId" clId="{97F4DC58-4984-41A3-985E-67067AFD3860}" dt="2019-11-29T13:35:55.545" v="339" actId="20577"/>
+          <ac:spMkLst>
+            <pc:docMk/>
+            <pc:sldMk cId="975161573" sldId="544"/>
+            <ac:spMk id="7" creationId="{F73E018D-5587-40E7-9F2A-A5E1AA30FD59}"/>
+          </ac:spMkLst>
+        </pc:spChg>
+        <pc:picChg chg="del">
+          <ac:chgData name="Fabricio Kassardjian" userId="912a6e5d1950f402" providerId="LiveId" clId="{97F4DC58-4984-41A3-985E-67067AFD3860}" dt="2019-11-29T13:36:15.030" v="352" actId="478"/>
+          <ac:picMkLst>
+            <pc:docMk/>
+            <pc:sldMk cId="975161573" sldId="544"/>
+            <ac:picMk id="3" creationId="{4E4BFE32-A7CE-4448-916B-F77A1CB747A9}"/>
+          </ac:picMkLst>
+        </pc:picChg>
+      </pc:sldChg>
+      <pc:sldChg chg="addSp modSp add">
+        <pc:chgData name="Fabricio Kassardjian" userId="912a6e5d1950f402" providerId="LiveId" clId="{97F4DC58-4984-41A3-985E-67067AFD3860}" dt="2019-11-29T13:34:58.604" v="254" actId="20577"/>
+        <pc:sldMkLst>
+          <pc:docMk/>
+          <pc:sldMk cId="3834853037" sldId="547"/>
+        </pc:sldMkLst>
+        <pc:spChg chg="mod">
+          <ac:chgData name="Fabricio Kassardjian" userId="912a6e5d1950f402" providerId="LiveId" clId="{97F4DC58-4984-41A3-985E-67067AFD3860}" dt="2019-11-29T13:34:58.604" v="254" actId="20577"/>
+          <ac:spMkLst>
+            <pc:docMk/>
+            <pc:sldMk cId="3834853037" sldId="547"/>
+            <ac:spMk id="5" creationId="{E4C27882-E319-405B-A0FC-24C99A3B60B5}"/>
+          </ac:spMkLst>
+        </pc:spChg>
+        <pc:spChg chg="add ord">
+          <ac:chgData name="Fabricio Kassardjian" userId="912a6e5d1950f402" providerId="LiveId" clId="{97F4DC58-4984-41A3-985E-67067AFD3860}" dt="2019-11-29T13:34:09.012" v="178" actId="167"/>
+          <ac:spMkLst>
+            <pc:docMk/>
+            <pc:sldMk cId="3834853037" sldId="547"/>
+            <ac:spMk id="6" creationId="{F70BB2AE-D17C-4909-A257-36E063E54DB1}"/>
+          </ac:spMkLst>
+        </pc:spChg>
+      </pc:sldChg>
+      <pc:sldChg chg="modSp add">
+        <pc:chgData name="Fabricio Kassardjian" userId="912a6e5d1950f402" providerId="LiveId" clId="{97F4DC58-4984-41A3-985E-67067AFD3860}" dt="2019-11-29T13:35:07.480" v="276" actId="20577"/>
+        <pc:sldMkLst>
+          <pc:docMk/>
+          <pc:sldMk cId="1488619366" sldId="548"/>
+        </pc:sldMkLst>
+        <pc:spChg chg="mod">
+          <ac:chgData name="Fabricio Kassardjian" userId="912a6e5d1950f402" providerId="LiveId" clId="{97F4DC58-4984-41A3-985E-67067AFD3860}" dt="2019-11-29T13:35:07.480" v="276" actId="20577"/>
+          <ac:spMkLst>
+            <pc:docMk/>
+            <pc:sldMk cId="1488619366" sldId="548"/>
+            <ac:spMk id="5" creationId="{E4C27882-E319-405B-A0FC-24C99A3B60B5}"/>
+          </ac:spMkLst>
+        </pc:spChg>
+        <pc:spChg chg="mod">
+          <ac:chgData name="Fabricio Kassardjian" userId="912a6e5d1950f402" providerId="LiveId" clId="{97F4DC58-4984-41A3-985E-67067AFD3860}" dt="2019-11-29T13:34:32.075" v="206" actId="1035"/>
+          <ac:spMkLst>
+            <pc:docMk/>
+            <pc:sldMk cId="1488619366" sldId="548"/>
+            <ac:spMk id="6" creationId="{F70BB2AE-D17C-4909-A257-36E063E54DB1}"/>
+          </ac:spMkLst>
+        </pc:spChg>
+      </pc:sldChg>
+      <pc:sldChg chg="modSp add">
+        <pc:chgData name="Fabricio Kassardjian" userId="912a6e5d1950f402" providerId="LiveId" clId="{97F4DC58-4984-41A3-985E-67067AFD3860}" dt="2019-11-29T13:35:18.934" v="296" actId="20577"/>
+        <pc:sldMkLst>
+          <pc:docMk/>
+          <pc:sldMk cId="611014377" sldId="549"/>
+        </pc:sldMkLst>
+        <pc:spChg chg="mod">
+          <ac:chgData name="Fabricio Kassardjian" userId="912a6e5d1950f402" providerId="LiveId" clId="{97F4DC58-4984-41A3-985E-67067AFD3860}" dt="2019-11-29T13:35:18.934" v="296" actId="20577"/>
+          <ac:spMkLst>
+            <pc:docMk/>
+            <pc:sldMk cId="611014377" sldId="549"/>
+            <ac:spMk id="5" creationId="{E4C27882-E319-405B-A0FC-24C99A3B60B5}"/>
+          </ac:spMkLst>
+        </pc:spChg>
+        <pc:spChg chg="mod">
+          <ac:chgData name="Fabricio Kassardjian" userId="912a6e5d1950f402" providerId="LiveId" clId="{97F4DC58-4984-41A3-985E-67067AFD3860}" dt="2019-11-29T13:34:42.450" v="234" actId="1035"/>
+          <ac:spMkLst>
+            <pc:docMk/>
+            <pc:sldMk cId="611014377" sldId="549"/>
+            <ac:spMk id="6" creationId="{F70BB2AE-D17C-4909-A257-36E063E54DB1}"/>
+          </ac:spMkLst>
+        </pc:spChg>
+      </pc:sldChg>
+      <pc:sldChg chg="modSp add ord">
+        <pc:chgData name="Fabricio Kassardjian" userId="912a6e5d1950f402" providerId="LiveId" clId="{97F4DC58-4984-41A3-985E-67067AFD3860}" dt="2019-11-29T13:35:50.075" v="337"/>
+        <pc:sldMkLst>
+          <pc:docMk/>
+          <pc:sldMk cId="1545497083" sldId="550"/>
+        </pc:sldMkLst>
+        <pc:spChg chg="mod">
+          <ac:chgData name="Fabricio Kassardjian" userId="912a6e5d1950f402" providerId="LiveId" clId="{97F4DC58-4984-41A3-985E-67067AFD3860}" dt="2019-11-29T13:35:33.953" v="332" actId="1036"/>
+          <ac:spMkLst>
+            <pc:docMk/>
+            <pc:sldMk cId="1545497083" sldId="550"/>
+            <ac:spMk id="6" creationId="{F70BB2AE-D17C-4909-A257-36E063E54DB1}"/>
+          </ac:spMkLst>
+        </pc:spChg>
+      </pc:sldChg>
+    </pc:docChg>
+  </pc:docChgLst>
 </pc:chgInfo>
 </file>
 
@@ -4146,7 +4327,7 @@
           <a:p>
             <a:fld id="{977A75FF-2340-4E7B-BCCB-4FA6BE567DBF}" type="slidenum">
               <a:rPr lang="pt-BR" smtClean="0"/>
-              <a:t>44</a:t>
+              <a:t>45</a:t>
             </a:fld>
             <a:endParaRPr lang="pt-BR"/>
           </a:p>
@@ -4233,7 +4414,7 @@
           <a:p>
             <a:fld id="{977A75FF-2340-4E7B-BCCB-4FA6BE567DBF}" type="slidenum">
               <a:rPr lang="pt-BR" smtClean="0"/>
-              <a:t>45</a:t>
+              <a:t>46</a:t>
             </a:fld>
             <a:endParaRPr lang="pt-BR"/>
           </a:p>
@@ -4461,7 +4642,7 @@
           <a:p>
             <a:fld id="{977A75FF-2340-4E7B-BCCB-4FA6BE567DBF}" type="slidenum">
               <a:rPr lang="pt-BR" smtClean="0"/>
-              <a:t>46</a:t>
+              <a:t>47</a:t>
             </a:fld>
             <a:endParaRPr lang="pt-BR"/>
           </a:p>
@@ -4548,7 +4729,7 @@
           <a:p>
             <a:fld id="{977A75FF-2340-4E7B-BCCB-4FA6BE567DBF}" type="slidenum">
               <a:rPr lang="pt-BR" smtClean="0"/>
-              <a:t>47</a:t>
+              <a:t>48</a:t>
             </a:fld>
             <a:endParaRPr lang="pt-BR"/>
           </a:p>
@@ -4648,7 +4829,7 @@
           <a:p>
             <a:fld id="{977A75FF-2340-4E7B-BCCB-4FA6BE567DBF}" type="slidenum">
               <a:rPr lang="pt-BR" smtClean="0"/>
-              <a:t>48</a:t>
+              <a:t>49</a:t>
             </a:fld>
             <a:endParaRPr lang="pt-BR"/>
           </a:p>
@@ -4735,7 +4916,7 @@
           <a:p>
             <a:fld id="{977A75FF-2340-4E7B-BCCB-4FA6BE567DBF}" type="slidenum">
               <a:rPr lang="pt-BR" smtClean="0"/>
-              <a:t>53</a:t>
+              <a:t>54</a:t>
             </a:fld>
             <a:endParaRPr lang="pt-BR"/>
           </a:p>
@@ -4822,7 +5003,7 @@
           <a:p>
             <a:fld id="{977A75FF-2340-4E7B-BCCB-4FA6BE567DBF}" type="slidenum">
               <a:rPr lang="pt-BR" smtClean="0"/>
-              <a:t>56</a:t>
+              <a:t>57</a:t>
             </a:fld>
             <a:endParaRPr lang="pt-BR"/>
           </a:p>
@@ -4909,7 +5090,7 @@
           <a:p>
             <a:fld id="{977A75FF-2340-4E7B-BCCB-4FA6BE567DBF}" type="slidenum">
               <a:rPr lang="pt-BR" smtClean="0"/>
-              <a:t>61</a:t>
+              <a:t>62</a:t>
             </a:fld>
             <a:endParaRPr lang="pt-BR"/>
           </a:p>
@@ -5042,7 +5223,7 @@
                 <a:tabLst/>
                 <a:defRPr/>
               </a:pPr>
-              <a:t>62</a:t>
+              <a:t>63</a:t>
             </a:fld>
             <a:endParaRPr kumimoji="0" lang="en-US" sz="1200" b="0" i="0" u="none" strike="noStrike" kern="1200" cap="none" spc="0" normalizeH="0" baseline="0" noProof="0" dirty="0">
               <a:ln>
@@ -5188,7 +5369,7 @@
                 <a:tabLst/>
                 <a:defRPr/>
               </a:pPr>
-              <a:t>63</a:t>
+              <a:t>64</a:t>
             </a:fld>
             <a:endParaRPr kumimoji="0" lang="en-US" sz="1200" b="0" i="0" u="none" strike="noStrike" kern="1200" cap="none" spc="0" normalizeH="0" baseline="0" noProof="0" dirty="0">
               <a:ln>
@@ -14618,7 +14799,7 @@
           <a:graphicData uri="http://schemas.openxmlformats.org/presentationml/2006/ole">
             <mc:AlternateContent xmlns:mc="http://schemas.openxmlformats.org/markup-compatibility/2006">
               <mc:Choice xmlns:v="urn:schemas-microsoft-com:vml" Requires="v">
-                <p:oleObj spid="_x0000_s1038" name="Acrobat Document" r:id="rId3" imgW="8039065" imgH="3467092" progId="AcroExch.Document.DC">
+                <p:oleObj spid="_x0000_s1026" name="Acrobat Document" r:id="rId3" imgW="8039065" imgH="3467092" progId="AcroExch.Document.DC">
                   <p:embed/>
                 </p:oleObj>
               </mc:Choice>
@@ -27447,7 +27628,36 @@
           <a:p>
             <a:r>
               <a:rPr lang="pt-BR" dirty="0"/>
-              <a:t> 	</a:t>
+              <a:t> 	          para </a:t>
+            </a:r>
+            <a:r>
+              <a:rPr lang="pt-BR" i="1" dirty="0">
+                <a:latin typeface="Times New Roman" panose="02020603050405020304" pitchFamily="18" charset="0"/>
+                <a:cs typeface="Times New Roman" panose="02020603050405020304" pitchFamily="18" charset="0"/>
+              </a:rPr>
+              <a:t>s</a:t>
+            </a:r>
+            <a:r>
+              <a:rPr lang="pt-BR" dirty="0"/>
+              <a:t> e </a:t>
+            </a:r>
+            <a:r>
+              <a:rPr lang="pt-BR" i="1" dirty="0">
+                <a:latin typeface="Times New Roman" panose="02020603050405020304" pitchFamily="18" charset="0"/>
+                <a:cs typeface="Times New Roman" panose="02020603050405020304" pitchFamily="18" charset="0"/>
+              </a:rPr>
+              <a:t>s’</a:t>
+            </a:r>
+            <a:r>
+              <a:rPr lang="pt-BR" dirty="0"/>
+              <a:t> vizinhos, 0 caso contrário e   </a:t>
+            </a:r>
+            <a:r>
+              <a:rPr lang="pt-BR" i="1" dirty="0">
+                <a:latin typeface="Times New Roman" panose="02020603050405020304" pitchFamily="18" charset="0"/>
+                <a:cs typeface="Times New Roman" panose="02020603050405020304" pitchFamily="18" charset="0"/>
+              </a:rPr>
+              <a:t>h = 0</a:t>
             </a:r>
           </a:p>
           <a:p>
@@ -27464,23 +27674,6 @@
           </a:p>
           <a:p>
             <a:endParaRPr lang="pt-BR" sz="500" dirty="0"/>
-          </a:p>
-          <a:p>
-            <a:pPr marL="0" indent="0">
-              <a:buNone/>
-            </a:pPr>
-            <a:r>
-              <a:rPr lang="pt-BR" b="1" dirty="0">
-                <a:solidFill>
-                  <a:srgbClr val="7030A0"/>
-                </a:solidFill>
-              </a:rPr>
-              <a:t>cromossomo</a:t>
-            </a:r>
-            <a:r>
-              <a:rPr lang="pt-BR" dirty="0"/>
-              <a:t>: vetor de inteiros com linhas da matriz concatenadas. Exemplo:</a:t>
-            </a:r>
           </a:p>
         </p:txBody>
       </p:sp>
@@ -27664,7 +27857,7 @@
         </p:blipFill>
         <p:spPr>
           <a:xfrm>
-            <a:off x="853382" y="1684994"/>
+            <a:off x="853382" y="1731174"/>
             <a:ext cx="1295512" cy="403895"/>
           </a:xfrm>
           <a:prstGeom prst="rect">
@@ -27674,10 +27867,10 @@
       </p:pic>
       <p:pic>
         <p:nvPicPr>
-          <p:cNvPr id="7" name="Imagem 6">
+          <p:cNvPr id="12" name="Imagem 11">
             <a:extLst>
               <a:ext uri="{FF2B5EF4-FFF2-40B4-BE49-F238E27FC236}">
-                <a16:creationId xmlns:a16="http://schemas.microsoft.com/office/drawing/2014/main" id="{35C7FAAB-4EFC-4D2A-AC1A-5253AB627212}"/>
+                <a16:creationId xmlns:a16="http://schemas.microsoft.com/office/drawing/2014/main" id="{F990910F-B17E-466E-BDF0-011C6D8EF831}"/>
               </a:ext>
             </a:extLst>
           </p:cNvPr>
@@ -27694,8 +27887,8 @@
         </p:blipFill>
         <p:spPr>
           <a:xfrm>
-            <a:off x="1950492" y="2525631"/>
-            <a:ext cx="5243014" cy="944962"/>
+            <a:off x="2777482" y="1773086"/>
+            <a:ext cx="175275" cy="335309"/>
           </a:xfrm>
           <a:prstGeom prst="rect">
             <a:avLst/>
@@ -27704,10 +27897,10 @@
       </p:pic>
       <p:pic>
         <p:nvPicPr>
-          <p:cNvPr id="8" name="Imagem 7">
+          <p:cNvPr id="14" name="Imagem 13">
             <a:extLst>
               <a:ext uri="{FF2B5EF4-FFF2-40B4-BE49-F238E27FC236}">
-                <a16:creationId xmlns:a16="http://schemas.microsoft.com/office/drawing/2014/main" id="{E5B3959C-6874-4444-A18E-7F8B10558258}"/>
+                <a16:creationId xmlns:a16="http://schemas.microsoft.com/office/drawing/2014/main" id="{A0DC37B5-CEDA-4EC1-897F-6569C196D002}"/>
               </a:ext>
             </a:extLst>
           </p:cNvPr>
@@ -27724,8 +27917,38 @@
         </p:blipFill>
         <p:spPr>
           <a:xfrm>
-            <a:off x="2074341" y="4102845"/>
-            <a:ext cx="4709568" cy="1775614"/>
+            <a:off x="3135621" y="1769277"/>
+            <a:ext cx="198137" cy="327688"/>
+          </a:xfrm>
+          <a:prstGeom prst="rect">
+            <a:avLst/>
+          </a:prstGeom>
+        </p:spPr>
+      </p:pic>
+      <p:pic>
+        <p:nvPicPr>
+          <p:cNvPr id="16" name="Imagem 15">
+            <a:extLst>
+              <a:ext uri="{FF2B5EF4-FFF2-40B4-BE49-F238E27FC236}">
+                <a16:creationId xmlns:a16="http://schemas.microsoft.com/office/drawing/2014/main" id="{BDD3D6B3-837E-4EC6-A0E6-E6ECE98DFF32}"/>
+              </a:ext>
+            </a:extLst>
+          </p:cNvPr>
+          <p:cNvPicPr>
+            <a:picLocks noChangeAspect="1"/>
+          </p:cNvPicPr>
+          <p:nvPr/>
+        </p:nvPicPr>
+        <p:blipFill>
+          <a:blip r:embed="rId6"/>
+          <a:stretch>
+            <a:fillRect/>
+          </a:stretch>
+        </p:blipFill>
+        <p:spPr>
+          <a:xfrm>
+            <a:off x="515371" y="2706285"/>
+            <a:ext cx="8390347" cy="2080440"/>
           </a:xfrm>
           <a:prstGeom prst="rect">
             <a:avLst/>
@@ -27746,6 +27969,235 @@
 </file>
 
 <file path=ppt/slides/slide43.xml><?xml version="1.0" encoding="utf-8"?>
+<p:sld xmlns:a="http://schemas.openxmlformats.org/drawingml/2006/main" xmlns:r="http://schemas.openxmlformats.org/officeDocument/2006/relationships" xmlns:p="http://schemas.openxmlformats.org/presentationml/2006/main">
+  <p:cSld>
+    <p:spTree>
+      <p:nvGrpSpPr>
+        <p:cNvPr id="1" name=""/>
+        <p:cNvGrpSpPr/>
+        <p:nvPr/>
+      </p:nvGrpSpPr>
+      <p:grpSpPr>
+        <a:xfrm>
+          <a:off x="0" y="0"/>
+          <a:ext cx="0" cy="0"/>
+          <a:chOff x="0" y="0"/>
+          <a:chExt cx="0" cy="0"/>
+        </a:xfrm>
+      </p:grpSpPr>
+      <p:sp>
+        <p:nvSpPr>
+          <p:cNvPr id="2" name="Espaço Reservado para Conteúdo 1">
+            <a:extLst>
+              <a:ext uri="{FF2B5EF4-FFF2-40B4-BE49-F238E27FC236}">
+                <a16:creationId xmlns:a16="http://schemas.microsoft.com/office/drawing/2014/main" id="{F03C2F21-D338-4655-BD72-C4C896381CC5}"/>
+              </a:ext>
+            </a:extLst>
+          </p:cNvPr>
+          <p:cNvSpPr>
+            <a:spLocks noGrp="1"/>
+          </p:cNvSpPr>
+          <p:nvPr>
+            <p:ph idx="1"/>
+          </p:nvPr>
+        </p:nvSpPr>
+        <p:spPr/>
+        <p:txBody>
+          <a:bodyPr/>
+          <a:lstStyle/>
+          <a:p>
+            <a:endParaRPr lang="pt-BR" b="1" dirty="0">
+              <a:solidFill>
+                <a:srgbClr val="7030A0"/>
+              </a:solidFill>
+            </a:endParaRPr>
+          </a:p>
+          <a:p>
+            <a:r>
+              <a:rPr lang="pt-BR" b="1" dirty="0">
+                <a:solidFill>
+                  <a:srgbClr val="7030A0"/>
+                </a:solidFill>
+              </a:rPr>
+              <a:t>cromossomo</a:t>
+            </a:r>
+            <a:r>
+              <a:rPr lang="pt-BR" dirty="0"/>
+              <a:t>: vetor de inteiros com linhas da matriz concatenadas. </a:t>
+            </a:r>
+          </a:p>
+          <a:p>
+            <a:r>
+              <a:rPr lang="pt-BR" dirty="0"/>
+              <a:t>Exemplo:</a:t>
+            </a:r>
+          </a:p>
+          <a:p>
+            <a:endParaRPr lang="pt-BR" dirty="0"/>
+          </a:p>
+        </p:txBody>
+      </p:sp>
+      <p:sp>
+        <p:nvSpPr>
+          <p:cNvPr id="3" name="Título 2">
+            <a:extLst>
+              <a:ext uri="{FF2B5EF4-FFF2-40B4-BE49-F238E27FC236}">
+                <a16:creationId xmlns:a16="http://schemas.microsoft.com/office/drawing/2014/main" id="{DA1328C1-BFB6-4BEB-9D4A-88BBD69047A2}"/>
+              </a:ext>
+            </a:extLst>
+          </p:cNvPr>
+          <p:cNvSpPr>
+            <a:spLocks noGrp="1"/>
+          </p:cNvSpPr>
+          <p:nvPr>
+            <p:ph type="title"/>
+          </p:nvPr>
+        </p:nvSpPr>
+        <p:spPr/>
+        <p:txBody>
+          <a:bodyPr/>
+          <a:lstStyle/>
+          <a:p>
+            <a:r>
+              <a:rPr lang="pt-BR" dirty="0"/>
+              <a:t>Definições para os testes</a:t>
+            </a:r>
+          </a:p>
+        </p:txBody>
+      </p:sp>
+      <p:sp>
+        <p:nvSpPr>
+          <p:cNvPr id="4" name="CaixaDeTexto 10">
+            <a:extLst>
+              <a:ext uri="{FF2B5EF4-FFF2-40B4-BE49-F238E27FC236}">
+                <a16:creationId xmlns:a16="http://schemas.microsoft.com/office/drawing/2014/main" id="{B35E30AF-37BE-46C2-8DEB-1C145144E7B6}"/>
+              </a:ext>
+            </a:extLst>
+          </p:cNvPr>
+          <p:cNvSpPr txBox="1"/>
+          <p:nvPr/>
+        </p:nvSpPr>
+        <p:spPr>
+          <a:xfrm>
+            <a:off x="692728" y="12620"/>
+            <a:ext cx="2347073" cy="511818"/>
+          </a:xfrm>
+          <a:prstGeom prst="rect">
+            <a:avLst/>
+          </a:prstGeom>
+          <a:noFill/>
+        </p:spPr>
+        <p:txBody>
+          <a:bodyPr wrap="none" lIns="80147" tIns="40074" rIns="80147" bIns="40074">
+            <a:spAutoFit/>
+          </a:bodyPr>
+          <a:lstStyle/>
+          <a:p>
+            <a:pPr algn="l" defTabSz="914239" fontAlgn="auto">
+              <a:spcBef>
+                <a:spcPts val="0"/>
+              </a:spcBef>
+              <a:spcAft>
+                <a:spcPts val="0"/>
+              </a:spcAft>
+              <a:defRPr/>
+            </a:pPr>
+            <a:r>
+              <a:rPr lang="pt-BR" sz="1400" b="1" cap="small" dirty="0">
+                <a:solidFill>
+                  <a:srgbClr val="002060"/>
+                </a:solidFill>
+                <a:latin typeface="+mn-lt"/>
+              </a:rPr>
+              <a:t>3. </a:t>
+            </a:r>
+            <a:r>
+              <a:rPr lang="pt-BR" sz="1400" b="1" cap="small" dirty="0">
+                <a:solidFill>
+                  <a:srgbClr val="002060"/>
+                </a:solidFill>
+              </a:rPr>
+              <a:t>Implementação e Resultados</a:t>
+            </a:r>
+            <a:endParaRPr lang="pt-BR" sz="1400" b="1" cap="small" dirty="0">
+              <a:solidFill>
+                <a:srgbClr val="002060"/>
+              </a:solidFill>
+              <a:latin typeface="+mn-lt"/>
+            </a:endParaRPr>
+          </a:p>
+          <a:p>
+            <a:pPr defTabSz="914239">
+              <a:defRPr/>
+            </a:pPr>
+            <a:r>
+              <a:rPr lang="pt-BR" sz="1400" b="1" cap="small" dirty="0">
+                <a:solidFill>
+                  <a:srgbClr val="002060"/>
+                </a:solidFill>
+              </a:rPr>
+              <a:t>3b. Modelo de </a:t>
+            </a:r>
+            <a:r>
+              <a:rPr lang="pt-BR" sz="1400" b="1" cap="small" dirty="0" err="1">
+                <a:solidFill>
+                  <a:srgbClr val="002060"/>
+                </a:solidFill>
+              </a:rPr>
+              <a:t>Ising</a:t>
+            </a:r>
+            <a:endParaRPr lang="pt-BR" sz="1400" b="1" cap="small" dirty="0">
+              <a:solidFill>
+                <a:srgbClr val="002060"/>
+              </a:solidFill>
+            </a:endParaRPr>
+          </a:p>
+        </p:txBody>
+      </p:sp>
+      <p:pic>
+        <p:nvPicPr>
+          <p:cNvPr id="5" name="Imagem 4">
+            <a:extLst>
+              <a:ext uri="{FF2B5EF4-FFF2-40B4-BE49-F238E27FC236}">
+                <a16:creationId xmlns:a16="http://schemas.microsoft.com/office/drawing/2014/main" id="{B571BD29-8E43-4ABA-A972-1180B133E075}"/>
+              </a:ext>
+            </a:extLst>
+          </p:cNvPr>
+          <p:cNvPicPr>
+            <a:picLocks noChangeAspect="1"/>
+          </p:cNvPicPr>
+          <p:nvPr/>
+        </p:nvPicPr>
+        <p:blipFill>
+          <a:blip r:embed="rId2"/>
+          <a:stretch>
+            <a:fillRect/>
+          </a:stretch>
+        </p:blipFill>
+        <p:spPr>
+          <a:xfrm>
+            <a:off x="1681160" y="2753630"/>
+            <a:ext cx="5827400" cy="2197062"/>
+          </a:xfrm>
+          <a:prstGeom prst="rect">
+            <a:avLst/>
+          </a:prstGeom>
+        </p:spPr>
+      </p:pic>
+    </p:spTree>
+    <p:extLst>
+      <p:ext uri="{BB962C8B-B14F-4D97-AF65-F5344CB8AC3E}">
+        <p14:creationId xmlns:p14="http://schemas.microsoft.com/office/powerpoint/2010/main" val="3678114660"/>
+      </p:ext>
+    </p:extLst>
+  </p:cSld>
+  <p:clrMapOvr>
+    <a:masterClrMapping/>
+  </p:clrMapOvr>
+</p:sld>
+</file>
+
+<file path=ppt/slides/slide44.xml><?xml version="1.0" encoding="utf-8"?>
 <p:sld xmlns:a="http://schemas.openxmlformats.org/drawingml/2006/main" xmlns:r="http://schemas.openxmlformats.org/officeDocument/2006/relationships" xmlns:p="http://schemas.openxmlformats.org/presentationml/2006/main">
   <p:cSld>
     <p:spTree>
@@ -27991,47 +28443,6 @@
           </a:p>
         </p:txBody>
       </p:sp>
-      <p:pic>
-        <p:nvPicPr>
-          <p:cNvPr id="7" name="Imagem 6">
-            <a:extLst>
-              <a:ext uri="{FF2B5EF4-FFF2-40B4-BE49-F238E27FC236}">
-                <a16:creationId xmlns:a16="http://schemas.microsoft.com/office/drawing/2014/main" id="{7C3B2D85-23E6-40BC-8E8E-FEDDF5F1ED07}"/>
-              </a:ext>
-            </a:extLst>
-          </p:cNvPr>
-          <p:cNvPicPr>
-            <a:picLocks noChangeAspect="1"/>
-          </p:cNvPicPr>
-          <p:nvPr/>
-        </p:nvPicPr>
-        <p:blipFill>
-          <a:blip r:embed="rId2">
-            <a:clrChange>
-              <a:clrFrom>
-                <a:srgbClr val="FFFFFF"/>
-              </a:clrFrom>
-              <a:clrTo>
-                <a:srgbClr val="FFFFFF">
-                  <a:alpha val="0"/>
-                </a:srgbClr>
-              </a:clrTo>
-            </a:clrChange>
-          </a:blip>
-          <a:stretch>
-            <a:fillRect/>
-          </a:stretch>
-        </p:blipFill>
-        <p:spPr>
-          <a:xfrm>
-            <a:off x="3272619" y="1262931"/>
-            <a:ext cx="3932261" cy="602032"/>
-          </a:xfrm>
-          <a:prstGeom prst="rect">
-            <a:avLst/>
-          </a:prstGeom>
-        </p:spPr>
-      </p:pic>
       <p:sp>
         <p:nvSpPr>
           <p:cNvPr id="3" name="Título 2">
@@ -28149,36 +28560,6 @@
           </a:p>
         </p:txBody>
       </p:sp>
-      <p:pic>
-        <p:nvPicPr>
-          <p:cNvPr id="8" name="Imagem 7">
-            <a:extLst>
-              <a:ext uri="{FF2B5EF4-FFF2-40B4-BE49-F238E27FC236}">
-                <a16:creationId xmlns:a16="http://schemas.microsoft.com/office/drawing/2014/main" id="{34D8A52B-B7FE-40FB-9B14-8BA278687B53}"/>
-              </a:ext>
-            </a:extLst>
-          </p:cNvPr>
-          <p:cNvPicPr>
-            <a:picLocks noChangeAspect="1"/>
-          </p:cNvPicPr>
-          <p:nvPr/>
-        </p:nvPicPr>
-        <p:blipFill>
-          <a:blip r:embed="rId3"/>
-          <a:stretch>
-            <a:fillRect/>
-          </a:stretch>
-        </p:blipFill>
-        <p:spPr>
-          <a:xfrm>
-            <a:off x="7854303" y="1343951"/>
-            <a:ext cx="274344" cy="342930"/>
-          </a:xfrm>
-          <a:prstGeom prst="rect">
-            <a:avLst/>
-          </a:prstGeom>
-        </p:spPr>
-      </p:pic>
     </p:spTree>
     <p:extLst>
       <p:ext uri="{BB962C8B-B14F-4D97-AF65-F5344CB8AC3E}">
@@ -28192,7 +28573,7 @@
 </p:sld>
 </file>
 
-<file path=ppt/slides/slide44.xml><?xml version="1.0" encoding="utf-8"?>
+<file path=ppt/slides/slide45.xml><?xml version="1.0" encoding="utf-8"?>
 <p:sld xmlns:a="http://schemas.openxmlformats.org/drawingml/2006/main" xmlns:r="http://schemas.openxmlformats.org/officeDocument/2006/relationships" xmlns:p="http://schemas.openxmlformats.org/presentationml/2006/main">
   <p:cSld>
     <p:spTree>
@@ -28556,7 +28937,7 @@
 </p:sld>
 </file>
 
-<file path=ppt/slides/slide45.xml><?xml version="1.0" encoding="utf-8"?>
+<file path=ppt/slides/slide46.xml><?xml version="1.0" encoding="utf-8"?>
 <p:sld xmlns:a="http://schemas.openxmlformats.org/drawingml/2006/main" xmlns:r="http://schemas.openxmlformats.org/officeDocument/2006/relationships" xmlns:p="http://schemas.openxmlformats.org/presentationml/2006/main">
   <p:cSld>
     <p:spTree>
@@ -32665,7 +33046,7 @@
 </p:sld>
 </file>
 
-<file path=ppt/slides/slide46.xml><?xml version="1.0" encoding="utf-8"?>
+<file path=ppt/slides/slide47.xml><?xml version="1.0" encoding="utf-8"?>
 <p:sld xmlns:a="http://schemas.openxmlformats.org/drawingml/2006/main" xmlns:r="http://schemas.openxmlformats.org/officeDocument/2006/relationships" xmlns:p="http://schemas.openxmlformats.org/presentationml/2006/main">
   <p:cSld>
     <p:spTree>
@@ -32847,7 +33228,7 @@
 </p:sld>
 </file>
 
-<file path=ppt/slides/slide47.xml><?xml version="1.0" encoding="utf-8"?>
+<file path=ppt/slides/slide48.xml><?xml version="1.0" encoding="utf-8"?>
 <p:sld xmlns:a="http://schemas.openxmlformats.org/drawingml/2006/main" xmlns:r="http://schemas.openxmlformats.org/officeDocument/2006/relationships" xmlns:p="http://schemas.openxmlformats.org/presentationml/2006/main">
   <p:cSld>
     <p:spTree>
@@ -38380,7 +38761,7 @@
 </p:sld>
 </file>
 
-<file path=ppt/slides/slide48.xml><?xml version="1.0" encoding="utf-8"?>
+<file path=ppt/slides/slide49.xml><?xml version="1.0" encoding="utf-8"?>
 <p:sld xmlns:a="http://schemas.openxmlformats.org/drawingml/2006/main" xmlns:r="http://schemas.openxmlformats.org/officeDocument/2006/relationships" xmlns:p="http://schemas.openxmlformats.org/presentationml/2006/main">
   <p:cSld>
     <p:spTree>
@@ -38441,7 +38822,7 @@
             <p:ph idx="1"/>
             <p:extLst>
               <p:ext uri="{D42A27DB-BD31-4B8C-83A1-F6EECF244321}">
-                <p14:modId xmlns:p14="http://schemas.microsoft.com/office/powerpoint/2010/main" val="3659527885"/>
+                <p14:modId xmlns:p14="http://schemas.microsoft.com/office/powerpoint/2010/main" val="3413565318"/>
               </p:ext>
             </p:extLst>
           </p:nvPr>
@@ -39729,7 +40110,7 @@
                     <a:p>
                       <a:pPr marL="0" algn="r" defTabSz="914400" rtl="0" eaLnBrk="1" fontAlgn="b" latinLnBrk="0" hangingPunct="1"/>
                       <a:r>
-                        <a:rPr lang="pt-BR" sz="2000" u="none" strike="noStrike" kern="1200">
+                        <a:rPr lang="pt-BR" sz="2000" u="none" strike="noStrike" kern="1200" dirty="0">
                           <a:solidFill>
                             <a:schemeClr val="dk1"/>
                           </a:solidFill>
@@ -39738,7 +40119,7 @@
                           <a:ea typeface="+mn-ea"/>
                           <a:cs typeface="+mn-cs"/>
                         </a:rPr>
-                        <a:t>0,8</a:t>
+                        <a:t>0,95</a:t>
                       </a:r>
                     </a:p>
                   </a:txBody>
@@ -41313,155 +41694,6 @@
     <p:extLst>
       <p:ext uri="{BB962C8B-B14F-4D97-AF65-F5344CB8AC3E}">
         <p14:creationId xmlns:p14="http://schemas.microsoft.com/office/powerpoint/2010/main" val="332057529"/>
-      </p:ext>
-    </p:extLst>
-  </p:cSld>
-  <p:clrMapOvr>
-    <a:masterClrMapping/>
-  </p:clrMapOvr>
-</p:sld>
-</file>
-
-<file path=ppt/slides/slide49.xml><?xml version="1.0" encoding="utf-8"?>
-<p:sld xmlns:a="http://schemas.openxmlformats.org/drawingml/2006/main" xmlns:r="http://schemas.openxmlformats.org/officeDocument/2006/relationships" xmlns:p="http://schemas.openxmlformats.org/presentationml/2006/main">
-  <p:cSld>
-    <p:spTree>
-      <p:nvGrpSpPr>
-        <p:cNvPr id="1" name=""/>
-        <p:cNvGrpSpPr/>
-        <p:nvPr/>
-      </p:nvGrpSpPr>
-      <p:grpSpPr>
-        <a:xfrm>
-          <a:off x="0" y="0"/>
-          <a:ext cx="0" cy="0"/>
-          <a:chOff x="0" y="0"/>
-          <a:chExt cx="0" cy="0"/>
-        </a:xfrm>
-      </p:grpSpPr>
-      <p:pic>
-        <p:nvPicPr>
-          <p:cNvPr id="5" name="Imagem 4">
-            <a:extLst>
-              <a:ext uri="{FF2B5EF4-FFF2-40B4-BE49-F238E27FC236}">
-                <a16:creationId xmlns:a16="http://schemas.microsoft.com/office/drawing/2014/main" id="{4C28BB43-708B-4E88-9171-58ED366BD75C}"/>
-              </a:ext>
-            </a:extLst>
-          </p:cNvPr>
-          <p:cNvPicPr>
-            <a:picLocks/>
-          </p:cNvPicPr>
-          <p:nvPr/>
-        </p:nvPicPr>
-        <p:blipFill>
-          <a:blip r:embed="rId2"/>
-          <a:stretch>
-            <a:fillRect/>
-          </a:stretch>
-        </p:blipFill>
-        <p:spPr>
-          <a:xfrm>
-            <a:off x="768600" y="669600"/>
-            <a:ext cx="7606800" cy="5518800"/>
-          </a:xfrm>
-          <a:prstGeom prst="rect">
-            <a:avLst/>
-          </a:prstGeom>
-        </p:spPr>
-      </p:pic>
-      <p:sp>
-        <p:nvSpPr>
-          <p:cNvPr id="6" name="CaixaDeTexto 10">
-            <a:extLst>
-              <a:ext uri="{FF2B5EF4-FFF2-40B4-BE49-F238E27FC236}">
-                <a16:creationId xmlns:a16="http://schemas.microsoft.com/office/drawing/2014/main" id="{63F69520-B715-4846-B8F3-A004A01DFF11}"/>
-              </a:ext>
-            </a:extLst>
-          </p:cNvPr>
-          <p:cNvSpPr txBox="1"/>
-          <p:nvPr/>
-        </p:nvSpPr>
-        <p:spPr>
-          <a:xfrm>
-            <a:off x="692728" y="12620"/>
-            <a:ext cx="2347073" cy="511818"/>
-          </a:xfrm>
-          <a:prstGeom prst="rect">
-            <a:avLst/>
-          </a:prstGeom>
-          <a:noFill/>
-        </p:spPr>
-        <p:txBody>
-          <a:bodyPr wrap="none" lIns="80147" tIns="40074" rIns="80147" bIns="40074">
-            <a:spAutoFit/>
-          </a:bodyPr>
-          <a:lstStyle/>
-          <a:p>
-            <a:pPr algn="l" defTabSz="914239" fontAlgn="auto">
-              <a:spcBef>
-                <a:spcPts val="0"/>
-              </a:spcBef>
-              <a:spcAft>
-                <a:spcPts val="0"/>
-              </a:spcAft>
-              <a:defRPr/>
-            </a:pPr>
-            <a:r>
-              <a:rPr lang="pt-BR" sz="1400" b="1" cap="small" dirty="0">
-                <a:solidFill>
-                  <a:srgbClr val="002060"/>
-                </a:solidFill>
-                <a:latin typeface="+mn-lt"/>
-              </a:rPr>
-              <a:t>3. </a:t>
-            </a:r>
-            <a:r>
-              <a:rPr lang="pt-BR" sz="1400" b="1" cap="small" dirty="0">
-                <a:solidFill>
-                  <a:srgbClr val="002060"/>
-                </a:solidFill>
-              </a:rPr>
-              <a:t>Implementação e Resultados</a:t>
-            </a:r>
-            <a:endParaRPr lang="pt-BR" sz="1400" b="1" cap="small" dirty="0">
-              <a:solidFill>
-                <a:srgbClr val="002060"/>
-              </a:solidFill>
-              <a:latin typeface="+mn-lt"/>
-            </a:endParaRPr>
-          </a:p>
-          <a:p>
-            <a:pPr defTabSz="914239">
-              <a:defRPr/>
-            </a:pPr>
-            <a:r>
-              <a:rPr lang="pt-BR" sz="1400" b="1" cap="small" dirty="0">
-                <a:solidFill>
-                  <a:srgbClr val="002060"/>
-                </a:solidFill>
-              </a:rPr>
-              <a:t>3b. Modelo de </a:t>
-            </a:r>
-            <a:r>
-              <a:rPr lang="pt-BR" sz="1400" b="1" cap="small" dirty="0" err="1">
-                <a:solidFill>
-                  <a:srgbClr val="002060"/>
-                </a:solidFill>
-              </a:rPr>
-              <a:t>Ising</a:t>
-            </a:r>
-            <a:endParaRPr lang="pt-BR" sz="1400" b="1" cap="small" dirty="0">
-              <a:solidFill>
-                <a:srgbClr val="002060"/>
-              </a:solidFill>
-            </a:endParaRPr>
-          </a:p>
-        </p:txBody>
-      </p:sp>
-    </p:spTree>
-    <p:extLst>
-      <p:ext uri="{BB962C8B-B14F-4D97-AF65-F5344CB8AC3E}">
-        <p14:creationId xmlns:p14="http://schemas.microsoft.com/office/powerpoint/2010/main" val="958099189"/>
       </p:ext>
     </p:extLst>
   </p:cSld>
@@ -41900,6 +42132,36 @@
           <a:chExt cx="0" cy="0"/>
         </a:xfrm>
       </p:grpSpPr>
+      <p:pic>
+        <p:nvPicPr>
+          <p:cNvPr id="5" name="Imagem 4">
+            <a:extLst>
+              <a:ext uri="{FF2B5EF4-FFF2-40B4-BE49-F238E27FC236}">
+                <a16:creationId xmlns:a16="http://schemas.microsoft.com/office/drawing/2014/main" id="{4C28BB43-708B-4E88-9171-58ED366BD75C}"/>
+              </a:ext>
+            </a:extLst>
+          </p:cNvPr>
+          <p:cNvPicPr>
+            <a:picLocks/>
+          </p:cNvPicPr>
+          <p:nvPr/>
+        </p:nvPicPr>
+        <p:blipFill>
+          <a:blip r:embed="rId2"/>
+          <a:stretch>
+            <a:fillRect/>
+          </a:stretch>
+        </p:blipFill>
+        <p:spPr>
+          <a:xfrm>
+            <a:off x="768600" y="669600"/>
+            <a:ext cx="7606800" cy="5518800"/>
+          </a:xfrm>
+          <a:prstGeom prst="rect">
+            <a:avLst/>
+          </a:prstGeom>
+        </p:spPr>
+      </p:pic>
       <p:sp>
         <p:nvSpPr>
           <p:cNvPr id="6" name="CaixaDeTexto 10">
@@ -41989,40 +42251,10 @@
           </a:p>
         </p:txBody>
       </p:sp>
-      <p:pic>
-        <p:nvPicPr>
-          <p:cNvPr id="2" name="Imagem 1">
-            <a:extLst>
-              <a:ext uri="{FF2B5EF4-FFF2-40B4-BE49-F238E27FC236}">
-                <a16:creationId xmlns:a16="http://schemas.microsoft.com/office/drawing/2014/main" id="{31A597D6-2F9B-4DAD-8B62-CD81FD2DA007}"/>
-              </a:ext>
-            </a:extLst>
-          </p:cNvPr>
-          <p:cNvPicPr>
-            <a:picLocks noChangeAspect="1"/>
-          </p:cNvPicPr>
-          <p:nvPr/>
-        </p:nvPicPr>
-        <p:blipFill>
-          <a:blip r:embed="rId2"/>
-          <a:stretch>
-            <a:fillRect/>
-          </a:stretch>
-        </p:blipFill>
-        <p:spPr>
-          <a:xfrm>
-            <a:off x="768853" y="670066"/>
-            <a:ext cx="7606293" cy="5517868"/>
-          </a:xfrm>
-          <a:prstGeom prst="rect">
-            <a:avLst/>
-          </a:prstGeom>
-        </p:spPr>
-      </p:pic>
     </p:spTree>
     <p:extLst>
       <p:ext uri="{BB962C8B-B14F-4D97-AF65-F5344CB8AC3E}">
-        <p14:creationId xmlns:p14="http://schemas.microsoft.com/office/powerpoint/2010/main" val="1344067984"/>
+        <p14:creationId xmlns:p14="http://schemas.microsoft.com/office/powerpoint/2010/main" val="958099189"/>
       </p:ext>
     </p:extLst>
   </p:cSld>
@@ -42140,6 +42372,155 @@
       </p:sp>
       <p:pic>
         <p:nvPicPr>
+          <p:cNvPr id="2" name="Imagem 1">
+            <a:extLst>
+              <a:ext uri="{FF2B5EF4-FFF2-40B4-BE49-F238E27FC236}">
+                <a16:creationId xmlns:a16="http://schemas.microsoft.com/office/drawing/2014/main" id="{31A597D6-2F9B-4DAD-8B62-CD81FD2DA007}"/>
+              </a:ext>
+            </a:extLst>
+          </p:cNvPr>
+          <p:cNvPicPr>
+            <a:picLocks noChangeAspect="1"/>
+          </p:cNvPicPr>
+          <p:nvPr/>
+        </p:nvPicPr>
+        <p:blipFill>
+          <a:blip r:embed="rId2"/>
+          <a:stretch>
+            <a:fillRect/>
+          </a:stretch>
+        </p:blipFill>
+        <p:spPr>
+          <a:xfrm>
+            <a:off x="768853" y="670066"/>
+            <a:ext cx="7606293" cy="5517868"/>
+          </a:xfrm>
+          <a:prstGeom prst="rect">
+            <a:avLst/>
+          </a:prstGeom>
+        </p:spPr>
+      </p:pic>
+    </p:spTree>
+    <p:extLst>
+      <p:ext uri="{BB962C8B-B14F-4D97-AF65-F5344CB8AC3E}">
+        <p14:creationId xmlns:p14="http://schemas.microsoft.com/office/powerpoint/2010/main" val="1344067984"/>
+      </p:ext>
+    </p:extLst>
+  </p:cSld>
+  <p:clrMapOvr>
+    <a:masterClrMapping/>
+  </p:clrMapOvr>
+</p:sld>
+</file>
+
+<file path=ppt/slides/slide52.xml><?xml version="1.0" encoding="utf-8"?>
+<p:sld xmlns:a="http://schemas.openxmlformats.org/drawingml/2006/main" xmlns:r="http://schemas.openxmlformats.org/officeDocument/2006/relationships" xmlns:p="http://schemas.openxmlformats.org/presentationml/2006/main">
+  <p:cSld>
+    <p:spTree>
+      <p:nvGrpSpPr>
+        <p:cNvPr id="1" name=""/>
+        <p:cNvGrpSpPr/>
+        <p:nvPr/>
+      </p:nvGrpSpPr>
+      <p:grpSpPr>
+        <a:xfrm>
+          <a:off x="0" y="0"/>
+          <a:ext cx="0" cy="0"/>
+          <a:chOff x="0" y="0"/>
+          <a:chExt cx="0" cy="0"/>
+        </a:xfrm>
+      </p:grpSpPr>
+      <p:sp>
+        <p:nvSpPr>
+          <p:cNvPr id="6" name="CaixaDeTexto 10">
+            <a:extLst>
+              <a:ext uri="{FF2B5EF4-FFF2-40B4-BE49-F238E27FC236}">
+                <a16:creationId xmlns:a16="http://schemas.microsoft.com/office/drawing/2014/main" id="{63F69520-B715-4846-B8F3-A004A01DFF11}"/>
+              </a:ext>
+            </a:extLst>
+          </p:cNvPr>
+          <p:cNvSpPr txBox="1"/>
+          <p:nvPr/>
+        </p:nvSpPr>
+        <p:spPr>
+          <a:xfrm>
+            <a:off x="692728" y="12620"/>
+            <a:ext cx="2347073" cy="511818"/>
+          </a:xfrm>
+          <a:prstGeom prst="rect">
+            <a:avLst/>
+          </a:prstGeom>
+          <a:noFill/>
+        </p:spPr>
+        <p:txBody>
+          <a:bodyPr wrap="none" lIns="80147" tIns="40074" rIns="80147" bIns="40074">
+            <a:spAutoFit/>
+          </a:bodyPr>
+          <a:lstStyle/>
+          <a:p>
+            <a:pPr algn="l" defTabSz="914239" fontAlgn="auto">
+              <a:spcBef>
+                <a:spcPts val="0"/>
+              </a:spcBef>
+              <a:spcAft>
+                <a:spcPts val="0"/>
+              </a:spcAft>
+              <a:defRPr/>
+            </a:pPr>
+            <a:r>
+              <a:rPr lang="pt-BR" sz="1400" b="1" cap="small" dirty="0">
+                <a:solidFill>
+                  <a:srgbClr val="002060"/>
+                </a:solidFill>
+                <a:latin typeface="+mn-lt"/>
+              </a:rPr>
+              <a:t>3. </a:t>
+            </a:r>
+            <a:r>
+              <a:rPr lang="pt-BR" sz="1400" b="1" cap="small" dirty="0">
+                <a:solidFill>
+                  <a:srgbClr val="002060"/>
+                </a:solidFill>
+              </a:rPr>
+              <a:t>Implementação e Resultados</a:t>
+            </a:r>
+            <a:endParaRPr lang="pt-BR" sz="1400" b="1" cap="small" dirty="0">
+              <a:solidFill>
+                <a:srgbClr val="002060"/>
+              </a:solidFill>
+              <a:latin typeface="+mn-lt"/>
+            </a:endParaRPr>
+          </a:p>
+          <a:p>
+            <a:pPr defTabSz="914239">
+              <a:defRPr/>
+            </a:pPr>
+            <a:r>
+              <a:rPr lang="pt-BR" sz="1400" b="1" cap="small" dirty="0">
+                <a:solidFill>
+                  <a:srgbClr val="002060"/>
+                </a:solidFill>
+              </a:rPr>
+              <a:t>3b. Modelo de </a:t>
+            </a:r>
+            <a:r>
+              <a:rPr lang="pt-BR" sz="1400" b="1" cap="small" dirty="0" err="1">
+                <a:solidFill>
+                  <a:srgbClr val="002060"/>
+                </a:solidFill>
+              </a:rPr>
+              <a:t>Ising</a:t>
+            </a:r>
+            <a:endParaRPr lang="pt-BR" sz="1400" b="1" cap="small" dirty="0">
+              <a:solidFill>
+                <a:srgbClr val="002060"/>
+              </a:solidFill>
+            </a:endParaRPr>
+          </a:p>
+        </p:txBody>
+      </p:sp>
+      <p:pic>
+        <p:nvPicPr>
           <p:cNvPr id="3" name="Imagem 2">
             <a:extLst>
               <a:ext uri="{FF2B5EF4-FFF2-40B4-BE49-F238E27FC236}">
@@ -42181,7 +42562,7 @@
 </p:sld>
 </file>
 
-<file path=ppt/slides/slide52.xml><?xml version="1.0" encoding="utf-8"?>
+<file path=ppt/slides/slide53.xml><?xml version="1.0" encoding="utf-8"?>
 <p:sld xmlns:a="http://schemas.openxmlformats.org/drawingml/2006/main" xmlns:r="http://schemas.openxmlformats.org/officeDocument/2006/relationships" xmlns:p="http://schemas.openxmlformats.org/presentationml/2006/main">
   <p:cSld>
     <p:spTree>
@@ -45064,7 +45445,7 @@
 </p:sld>
 </file>
 
-<file path=ppt/slides/slide53.xml><?xml version="1.0" encoding="utf-8"?>
+<file path=ppt/slides/slide54.xml><?xml version="1.0" encoding="utf-8"?>
 <p:sld xmlns:a="http://schemas.openxmlformats.org/drawingml/2006/main" xmlns:r="http://schemas.openxmlformats.org/officeDocument/2006/relationships" xmlns:p="http://schemas.openxmlformats.org/presentationml/2006/main">
   <p:cSld>
     <p:spTree>
@@ -45243,7 +45624,7 @@
 </p:sld>
 </file>
 
-<file path=ppt/slides/slide54.xml><?xml version="1.0" encoding="utf-8"?>
+<file path=ppt/slides/slide55.xml><?xml version="1.0" encoding="utf-8"?>
 <p:sld xmlns:a="http://schemas.openxmlformats.org/drawingml/2006/main" xmlns:r="http://schemas.openxmlformats.org/officeDocument/2006/relationships" xmlns:p="http://schemas.openxmlformats.org/presentationml/2006/main">
   <p:cSld>
     <p:spTree>
@@ -45422,7 +45803,7 @@
 </p:sld>
 </file>
 
-<file path=ppt/slides/slide55.xml><?xml version="1.0" encoding="utf-8"?>
+<file path=ppt/slides/slide56.xml><?xml version="1.0" encoding="utf-8"?>
 <p:sld xmlns:a="http://schemas.openxmlformats.org/drawingml/2006/main" xmlns:r="http://schemas.openxmlformats.org/officeDocument/2006/relationships" xmlns:p="http://schemas.openxmlformats.org/presentationml/2006/main">
   <p:cSld>
     <p:spTree>
@@ -45599,7 +45980,7 @@
 </p:sld>
 </file>
 
-<file path=ppt/slides/slide56.xml><?xml version="1.0" encoding="utf-8"?>
+<file path=ppt/slides/slide57.xml><?xml version="1.0" encoding="utf-8"?>
 <p:sld xmlns:a="http://schemas.openxmlformats.org/drawingml/2006/main" xmlns:r="http://schemas.openxmlformats.org/officeDocument/2006/relationships" xmlns:p="http://schemas.openxmlformats.org/presentationml/2006/main">
   <p:cSld>
     <p:spTree>
@@ -45924,7 +46305,7 @@
 </p:sld>
 </file>
 
-<file path=ppt/slides/slide57.xml><?xml version="1.0" encoding="utf-8"?>
+<file path=ppt/slides/slide58.xml><?xml version="1.0" encoding="utf-8"?>
 <p:sld xmlns:a="http://schemas.openxmlformats.org/drawingml/2006/main" xmlns:r="http://schemas.openxmlformats.org/officeDocument/2006/relationships" xmlns:p="http://schemas.openxmlformats.org/presentationml/2006/main">
   <p:cSld>
     <p:spTree>
@@ -46160,155 +46541,6 @@
 </p:sld>
 </file>
 
-<file path=ppt/slides/slide58.xml><?xml version="1.0" encoding="utf-8"?>
-<p:sld xmlns:a="http://schemas.openxmlformats.org/drawingml/2006/main" xmlns:r="http://schemas.openxmlformats.org/officeDocument/2006/relationships" xmlns:p="http://schemas.openxmlformats.org/presentationml/2006/main">
-  <p:cSld>
-    <p:spTree>
-      <p:nvGrpSpPr>
-        <p:cNvPr id="1" name=""/>
-        <p:cNvGrpSpPr/>
-        <p:nvPr/>
-      </p:nvGrpSpPr>
-      <p:grpSpPr>
-        <a:xfrm>
-          <a:off x="0" y="0"/>
-          <a:ext cx="0" cy="0"/>
-          <a:chOff x="0" y="0"/>
-          <a:chExt cx="0" cy="0"/>
-        </a:xfrm>
-      </p:grpSpPr>
-      <p:sp>
-        <p:nvSpPr>
-          <p:cNvPr id="3" name="CaixaDeTexto 10">
-            <a:extLst>
-              <a:ext uri="{FF2B5EF4-FFF2-40B4-BE49-F238E27FC236}">
-                <a16:creationId xmlns:a16="http://schemas.microsoft.com/office/drawing/2014/main" id="{41487511-6A80-47B8-A2C9-FE2D1574A153}"/>
-              </a:ext>
-            </a:extLst>
-          </p:cNvPr>
-          <p:cNvSpPr txBox="1"/>
-          <p:nvPr/>
-        </p:nvSpPr>
-        <p:spPr>
-          <a:xfrm>
-            <a:off x="692728" y="12620"/>
-            <a:ext cx="2347073" cy="511818"/>
-          </a:xfrm>
-          <a:prstGeom prst="rect">
-            <a:avLst/>
-          </a:prstGeom>
-          <a:noFill/>
-        </p:spPr>
-        <p:txBody>
-          <a:bodyPr wrap="none" lIns="80147" tIns="40074" rIns="80147" bIns="40074">
-            <a:spAutoFit/>
-          </a:bodyPr>
-          <a:lstStyle/>
-          <a:p>
-            <a:pPr algn="l" defTabSz="914239" fontAlgn="auto">
-              <a:spcBef>
-                <a:spcPts val="0"/>
-              </a:spcBef>
-              <a:spcAft>
-                <a:spcPts val="0"/>
-              </a:spcAft>
-              <a:defRPr/>
-            </a:pPr>
-            <a:r>
-              <a:rPr lang="pt-BR" sz="1400" b="1" cap="small" dirty="0">
-                <a:solidFill>
-                  <a:srgbClr val="002060"/>
-                </a:solidFill>
-                <a:latin typeface="+mn-lt"/>
-              </a:rPr>
-              <a:t>3. </a:t>
-            </a:r>
-            <a:r>
-              <a:rPr lang="pt-BR" sz="1400" b="1" cap="small" dirty="0">
-                <a:solidFill>
-                  <a:srgbClr val="002060"/>
-                </a:solidFill>
-              </a:rPr>
-              <a:t>Implementação e Resultados</a:t>
-            </a:r>
-            <a:endParaRPr lang="pt-BR" sz="1400" b="1" cap="small" dirty="0">
-              <a:solidFill>
-                <a:srgbClr val="002060"/>
-              </a:solidFill>
-              <a:latin typeface="+mn-lt"/>
-            </a:endParaRPr>
-          </a:p>
-          <a:p>
-            <a:pPr defTabSz="914239">
-              <a:defRPr/>
-            </a:pPr>
-            <a:r>
-              <a:rPr lang="pt-BR" sz="1400" b="1" cap="small" dirty="0">
-                <a:solidFill>
-                  <a:srgbClr val="002060"/>
-                </a:solidFill>
-              </a:rPr>
-              <a:t>3b. Modelo de </a:t>
-            </a:r>
-            <a:r>
-              <a:rPr lang="pt-BR" sz="1400" b="1" cap="small" dirty="0" err="1">
-                <a:solidFill>
-                  <a:srgbClr val="002060"/>
-                </a:solidFill>
-              </a:rPr>
-              <a:t>Ising</a:t>
-            </a:r>
-            <a:endParaRPr lang="pt-BR" sz="1400" b="1" cap="small" dirty="0">
-              <a:solidFill>
-                <a:srgbClr val="002060"/>
-              </a:solidFill>
-            </a:endParaRPr>
-          </a:p>
-        </p:txBody>
-      </p:sp>
-      <p:pic>
-        <p:nvPicPr>
-          <p:cNvPr id="4" name="Imagem 3">
-            <a:extLst>
-              <a:ext uri="{FF2B5EF4-FFF2-40B4-BE49-F238E27FC236}">
-                <a16:creationId xmlns:a16="http://schemas.microsoft.com/office/drawing/2014/main" id="{3EEB8A90-2208-4D07-856B-E15AE74A43C8}"/>
-              </a:ext>
-            </a:extLst>
-          </p:cNvPr>
-          <p:cNvPicPr>
-            <a:picLocks noChangeAspect="1"/>
-          </p:cNvPicPr>
-          <p:nvPr/>
-        </p:nvPicPr>
-        <p:blipFill>
-          <a:blip r:embed="rId2"/>
-          <a:stretch>
-            <a:fillRect/>
-          </a:stretch>
-        </p:blipFill>
-        <p:spPr>
-          <a:xfrm>
-            <a:off x="771236" y="671794"/>
-            <a:ext cx="7601527" cy="5514412"/>
-          </a:xfrm>
-          <a:prstGeom prst="rect">
-            <a:avLst/>
-          </a:prstGeom>
-        </p:spPr>
-      </p:pic>
-    </p:spTree>
-    <p:extLst>
-      <p:ext uri="{BB962C8B-B14F-4D97-AF65-F5344CB8AC3E}">
-        <p14:creationId xmlns:p14="http://schemas.microsoft.com/office/powerpoint/2010/main" val="73556571"/>
-      </p:ext>
-    </p:extLst>
-  </p:cSld>
-  <p:clrMapOvr>
-    <a:masterClrMapping/>
-  </p:clrMapOvr>
-</p:sld>
-</file>
-
 <file path=ppt/slides/slide59.xml><?xml version="1.0" encoding="utf-8"?>
 <p:sld xmlns:a="http://schemas.openxmlformats.org/drawingml/2006/main" xmlns:r="http://schemas.openxmlformats.org/officeDocument/2006/relationships" xmlns:p="http://schemas.openxmlformats.org/presentationml/2006/main">
   <p:cSld>
@@ -46417,10 +46649,10 @@
       </p:sp>
       <p:pic>
         <p:nvPicPr>
-          <p:cNvPr id="2" name="Imagem 1">
+          <p:cNvPr id="4" name="Imagem 3">
             <a:extLst>
               <a:ext uri="{FF2B5EF4-FFF2-40B4-BE49-F238E27FC236}">
-                <a16:creationId xmlns:a16="http://schemas.microsoft.com/office/drawing/2014/main" id="{540B6B3E-E5FC-468B-8DCE-96733BCC9D70}"/>
+                <a16:creationId xmlns:a16="http://schemas.microsoft.com/office/drawing/2014/main" id="{3EEB8A90-2208-4D07-856B-E15AE74A43C8}"/>
               </a:ext>
             </a:extLst>
           </p:cNvPr>
@@ -46437,8 +46669,8 @@
         </p:blipFill>
         <p:spPr>
           <a:xfrm>
-            <a:off x="775655" y="675000"/>
-            <a:ext cx="7592690" cy="5508000"/>
+            <a:off x="771236" y="671794"/>
+            <a:ext cx="7601527" cy="5514412"/>
           </a:xfrm>
           <a:prstGeom prst="rect">
             <a:avLst/>
@@ -46448,7 +46680,7 @@
     </p:spTree>
     <p:extLst>
       <p:ext uri="{BB962C8B-B14F-4D97-AF65-F5344CB8AC3E}">
-        <p14:creationId xmlns:p14="http://schemas.microsoft.com/office/powerpoint/2010/main" val="2594964007"/>
+        <p14:creationId xmlns:p14="http://schemas.microsoft.com/office/powerpoint/2010/main" val="73556571"/>
       </p:ext>
     </p:extLst>
   </p:cSld>
@@ -46869,6 +47101,155 @@
       </p:sp>
       <p:pic>
         <p:nvPicPr>
+          <p:cNvPr id="2" name="Imagem 1">
+            <a:extLst>
+              <a:ext uri="{FF2B5EF4-FFF2-40B4-BE49-F238E27FC236}">
+                <a16:creationId xmlns:a16="http://schemas.microsoft.com/office/drawing/2014/main" id="{540B6B3E-E5FC-468B-8DCE-96733BCC9D70}"/>
+              </a:ext>
+            </a:extLst>
+          </p:cNvPr>
+          <p:cNvPicPr>
+            <a:picLocks noChangeAspect="1"/>
+          </p:cNvPicPr>
+          <p:nvPr/>
+        </p:nvPicPr>
+        <p:blipFill>
+          <a:blip r:embed="rId2"/>
+          <a:stretch>
+            <a:fillRect/>
+          </a:stretch>
+        </p:blipFill>
+        <p:spPr>
+          <a:xfrm>
+            <a:off x="775655" y="675000"/>
+            <a:ext cx="7592690" cy="5508000"/>
+          </a:xfrm>
+          <a:prstGeom prst="rect">
+            <a:avLst/>
+          </a:prstGeom>
+        </p:spPr>
+      </p:pic>
+    </p:spTree>
+    <p:extLst>
+      <p:ext uri="{BB962C8B-B14F-4D97-AF65-F5344CB8AC3E}">
+        <p14:creationId xmlns:p14="http://schemas.microsoft.com/office/powerpoint/2010/main" val="2594964007"/>
+      </p:ext>
+    </p:extLst>
+  </p:cSld>
+  <p:clrMapOvr>
+    <a:masterClrMapping/>
+  </p:clrMapOvr>
+</p:sld>
+</file>
+
+<file path=ppt/slides/slide61.xml><?xml version="1.0" encoding="utf-8"?>
+<p:sld xmlns:a="http://schemas.openxmlformats.org/drawingml/2006/main" xmlns:r="http://schemas.openxmlformats.org/officeDocument/2006/relationships" xmlns:p="http://schemas.openxmlformats.org/presentationml/2006/main">
+  <p:cSld>
+    <p:spTree>
+      <p:nvGrpSpPr>
+        <p:cNvPr id="1" name=""/>
+        <p:cNvGrpSpPr/>
+        <p:nvPr/>
+      </p:nvGrpSpPr>
+      <p:grpSpPr>
+        <a:xfrm>
+          <a:off x="0" y="0"/>
+          <a:ext cx="0" cy="0"/>
+          <a:chOff x="0" y="0"/>
+          <a:chExt cx="0" cy="0"/>
+        </a:xfrm>
+      </p:grpSpPr>
+      <p:sp>
+        <p:nvSpPr>
+          <p:cNvPr id="3" name="CaixaDeTexto 10">
+            <a:extLst>
+              <a:ext uri="{FF2B5EF4-FFF2-40B4-BE49-F238E27FC236}">
+                <a16:creationId xmlns:a16="http://schemas.microsoft.com/office/drawing/2014/main" id="{41487511-6A80-47B8-A2C9-FE2D1574A153}"/>
+              </a:ext>
+            </a:extLst>
+          </p:cNvPr>
+          <p:cNvSpPr txBox="1"/>
+          <p:nvPr/>
+        </p:nvSpPr>
+        <p:spPr>
+          <a:xfrm>
+            <a:off x="692728" y="12620"/>
+            <a:ext cx="2347073" cy="511818"/>
+          </a:xfrm>
+          <a:prstGeom prst="rect">
+            <a:avLst/>
+          </a:prstGeom>
+          <a:noFill/>
+        </p:spPr>
+        <p:txBody>
+          <a:bodyPr wrap="none" lIns="80147" tIns="40074" rIns="80147" bIns="40074">
+            <a:spAutoFit/>
+          </a:bodyPr>
+          <a:lstStyle/>
+          <a:p>
+            <a:pPr algn="l" defTabSz="914239" fontAlgn="auto">
+              <a:spcBef>
+                <a:spcPts val="0"/>
+              </a:spcBef>
+              <a:spcAft>
+                <a:spcPts val="0"/>
+              </a:spcAft>
+              <a:defRPr/>
+            </a:pPr>
+            <a:r>
+              <a:rPr lang="pt-BR" sz="1400" b="1" cap="small" dirty="0">
+                <a:solidFill>
+                  <a:srgbClr val="002060"/>
+                </a:solidFill>
+                <a:latin typeface="+mn-lt"/>
+              </a:rPr>
+              <a:t>3. </a:t>
+            </a:r>
+            <a:r>
+              <a:rPr lang="pt-BR" sz="1400" b="1" cap="small" dirty="0">
+                <a:solidFill>
+                  <a:srgbClr val="002060"/>
+                </a:solidFill>
+              </a:rPr>
+              <a:t>Implementação e Resultados</a:t>
+            </a:r>
+            <a:endParaRPr lang="pt-BR" sz="1400" b="1" cap="small" dirty="0">
+              <a:solidFill>
+                <a:srgbClr val="002060"/>
+              </a:solidFill>
+              <a:latin typeface="+mn-lt"/>
+            </a:endParaRPr>
+          </a:p>
+          <a:p>
+            <a:pPr defTabSz="914239">
+              <a:defRPr/>
+            </a:pPr>
+            <a:r>
+              <a:rPr lang="pt-BR" sz="1400" b="1" cap="small" dirty="0">
+                <a:solidFill>
+                  <a:srgbClr val="002060"/>
+                </a:solidFill>
+              </a:rPr>
+              <a:t>3b. Modelo de </a:t>
+            </a:r>
+            <a:r>
+              <a:rPr lang="pt-BR" sz="1400" b="1" cap="small" dirty="0" err="1">
+                <a:solidFill>
+                  <a:srgbClr val="002060"/>
+                </a:solidFill>
+              </a:rPr>
+              <a:t>Ising</a:t>
+            </a:r>
+            <a:endParaRPr lang="pt-BR" sz="1400" b="1" cap="small" dirty="0">
+              <a:solidFill>
+                <a:srgbClr val="002060"/>
+              </a:solidFill>
+            </a:endParaRPr>
+          </a:p>
+        </p:txBody>
+      </p:sp>
+      <p:pic>
+        <p:nvPicPr>
           <p:cNvPr id="4" name="Imagem 3">
             <a:extLst>
               <a:ext uri="{FF2B5EF4-FFF2-40B4-BE49-F238E27FC236}">
@@ -46910,7 +47291,7 @@
 </p:sld>
 </file>
 
-<file path=ppt/slides/slide61.xml><?xml version="1.0" encoding="utf-8"?>
+<file path=ppt/slides/slide62.xml><?xml version="1.0" encoding="utf-8"?>
 <p:sld xmlns:a="http://schemas.openxmlformats.org/drawingml/2006/main" xmlns:r="http://schemas.openxmlformats.org/officeDocument/2006/relationships" xmlns:p="http://schemas.openxmlformats.org/presentationml/2006/main">
   <p:cSld>
     <p:spTree>
@@ -47098,7 +47479,7 @@
 </p:sld>
 </file>
 
-<file path=ppt/slides/slide62.xml><?xml version="1.0" encoding="utf-8"?>
+<file path=ppt/slides/slide63.xml><?xml version="1.0" encoding="utf-8"?>
 <p:sld xmlns:a="http://schemas.openxmlformats.org/drawingml/2006/main" xmlns:r="http://schemas.openxmlformats.org/officeDocument/2006/relationships" xmlns:p="http://schemas.openxmlformats.org/presentationml/2006/main">
   <p:cSld>
     <p:spTree>
@@ -47529,7 +47910,7 @@
 </p:sld>
 </file>
 
-<file path=ppt/slides/slide63.xml><?xml version="1.0" encoding="utf-8"?>
+<file path=ppt/slides/slide64.xml><?xml version="1.0" encoding="utf-8"?>
 <p:sld xmlns:a="http://schemas.openxmlformats.org/drawingml/2006/main" xmlns:r="http://schemas.openxmlformats.org/officeDocument/2006/relationships" xmlns:p="http://schemas.openxmlformats.org/presentationml/2006/main">
   <p:cSld>
     <p:spTree>

</xml_diff>